<commit_message>
Update architecture diagram to include KMS.
</commit_message>
<xml_diff>
--- a/architecture.pptx
+++ b/architecture.pptx
@@ -106,6 +106,11 @@
       </a:defRPr>
     </a:lvl9pPr>
   </p:defaultTextStyle>
+  <p:extLst>
+    <p:ext uri="{EFAFB233-063F-42B5-8137-9DF3F51BA10A}">
+      <p15:sldGuideLst xmlns:p15="http://schemas.microsoft.com/office/powerpoint/2012/main"/>
+    </p:ext>
+  </p:extLst>
 </p:presentation>
 </file>
 
@@ -240,7 +245,7 @@
           <a:p>
             <a:fld id="{09AF90EC-DFC1-46E7-9D31-BF3EBB9F9872}" type="datetimeFigureOut">
               <a:rPr lang="en-US" smtClean="0"/>
-              <a:t>7/2/2017</a:t>
+              <a:t>7/15/2017</a:t>
             </a:fld>
             <a:endParaRPr lang="en-US"/>
           </a:p>
@@ -410,7 +415,7 @@
           <a:p>
             <a:fld id="{09AF90EC-DFC1-46E7-9D31-BF3EBB9F9872}" type="datetimeFigureOut">
               <a:rPr lang="en-US" smtClean="0"/>
-              <a:t>7/2/2017</a:t>
+              <a:t>7/15/2017</a:t>
             </a:fld>
             <a:endParaRPr lang="en-US"/>
           </a:p>
@@ -590,7 +595,7 @@
           <a:p>
             <a:fld id="{09AF90EC-DFC1-46E7-9D31-BF3EBB9F9872}" type="datetimeFigureOut">
               <a:rPr lang="en-US" smtClean="0"/>
-              <a:t>7/2/2017</a:t>
+              <a:t>7/15/2017</a:t>
             </a:fld>
             <a:endParaRPr lang="en-US"/>
           </a:p>
@@ -760,7 +765,7 @@
           <a:p>
             <a:fld id="{09AF90EC-DFC1-46E7-9D31-BF3EBB9F9872}" type="datetimeFigureOut">
               <a:rPr lang="en-US" smtClean="0"/>
-              <a:t>7/2/2017</a:t>
+              <a:t>7/15/2017</a:t>
             </a:fld>
             <a:endParaRPr lang="en-US"/>
           </a:p>
@@ -1006,7 +1011,7 @@
           <a:p>
             <a:fld id="{09AF90EC-DFC1-46E7-9D31-BF3EBB9F9872}" type="datetimeFigureOut">
               <a:rPr lang="en-US" smtClean="0"/>
-              <a:t>7/2/2017</a:t>
+              <a:t>7/15/2017</a:t>
             </a:fld>
             <a:endParaRPr lang="en-US"/>
           </a:p>
@@ -1238,7 +1243,7 @@
           <a:p>
             <a:fld id="{09AF90EC-DFC1-46E7-9D31-BF3EBB9F9872}" type="datetimeFigureOut">
               <a:rPr lang="en-US" smtClean="0"/>
-              <a:t>7/2/2017</a:t>
+              <a:t>7/15/2017</a:t>
             </a:fld>
             <a:endParaRPr lang="en-US"/>
           </a:p>
@@ -1605,7 +1610,7 @@
           <a:p>
             <a:fld id="{09AF90EC-DFC1-46E7-9D31-BF3EBB9F9872}" type="datetimeFigureOut">
               <a:rPr lang="en-US" smtClean="0"/>
-              <a:t>7/2/2017</a:t>
+              <a:t>7/15/2017</a:t>
             </a:fld>
             <a:endParaRPr lang="en-US"/>
           </a:p>
@@ -1723,7 +1728,7 @@
           <a:p>
             <a:fld id="{09AF90EC-DFC1-46E7-9D31-BF3EBB9F9872}" type="datetimeFigureOut">
               <a:rPr lang="en-US" smtClean="0"/>
-              <a:t>7/2/2017</a:t>
+              <a:t>7/15/2017</a:t>
             </a:fld>
             <a:endParaRPr lang="en-US"/>
           </a:p>
@@ -1818,7 +1823,7 @@
           <a:p>
             <a:fld id="{09AF90EC-DFC1-46E7-9D31-BF3EBB9F9872}" type="datetimeFigureOut">
               <a:rPr lang="en-US" smtClean="0"/>
-              <a:t>7/2/2017</a:t>
+              <a:t>7/15/2017</a:t>
             </a:fld>
             <a:endParaRPr lang="en-US"/>
           </a:p>
@@ -2095,7 +2100,7 @@
           <a:p>
             <a:fld id="{09AF90EC-DFC1-46E7-9D31-BF3EBB9F9872}" type="datetimeFigureOut">
               <a:rPr lang="en-US" smtClean="0"/>
-              <a:t>7/2/2017</a:t>
+              <a:t>7/15/2017</a:t>
             </a:fld>
             <a:endParaRPr lang="en-US"/>
           </a:p>
@@ -2348,7 +2353,7 @@
           <a:p>
             <a:fld id="{09AF90EC-DFC1-46E7-9D31-BF3EBB9F9872}" type="datetimeFigureOut">
               <a:rPr lang="en-US" smtClean="0"/>
-              <a:t>7/2/2017</a:t>
+              <a:t>7/15/2017</a:t>
             </a:fld>
             <a:endParaRPr lang="en-US"/>
           </a:p>
@@ -2561,7 +2566,7 @@
           <a:p>
             <a:fld id="{09AF90EC-DFC1-46E7-9D31-BF3EBB9F9872}" type="datetimeFigureOut">
               <a:rPr lang="en-US" smtClean="0"/>
-              <a:t>7/2/2017</a:t>
+              <a:t>7/15/2017</a:t>
             </a:fld>
             <a:endParaRPr lang="en-US"/>
           </a:p>
@@ -3042,8 +3047,8 @@
         </p:nvGrpSpPr>
         <p:grpSpPr>
           <a:xfrm>
-            <a:off x="6131493" y="3899319"/>
-            <a:ext cx="770738" cy="694317"/>
+            <a:off x="6155069" y="4672014"/>
+            <a:ext cx="687040" cy="618918"/>
             <a:chOff x="365197" y="709817"/>
             <a:chExt cx="894752" cy="806035"/>
           </a:xfrm>
@@ -3118,8 +3123,8 @@
         </p:nvGrpSpPr>
         <p:grpSpPr>
           <a:xfrm>
-            <a:off x="7049805" y="1857801"/>
-            <a:ext cx="854856" cy="729414"/>
+            <a:off x="7119980" y="1992765"/>
+            <a:ext cx="767045" cy="654488"/>
             <a:chOff x="344931" y="710759"/>
             <a:chExt cx="943550" cy="805093"/>
           </a:xfrm>
@@ -3331,11 +3336,7 @@
               <a:pPr algn="ctr"/>
               <a:r>
                 <a:rPr lang="en-US" sz="1000" b="1" dirty="0" smtClean="0"/>
-                <a:t>API </a:t>
-              </a:r>
-              <a:r>
-                <a:rPr lang="en-US" sz="1000" b="1" dirty="0" smtClean="0"/>
-                <a:t>Gateway</a:t>
+                <a:t>API Gateway</a:t>
               </a:r>
               <a:endParaRPr lang="en-US" b="1" dirty="0"/>
             </a:p>
@@ -3725,7 +3726,7 @@
         </p:nvGrpSpPr>
         <p:grpSpPr>
           <a:xfrm>
-            <a:off x="5988677" y="4707107"/>
+            <a:off x="5988677" y="5395159"/>
             <a:ext cx="1129871" cy="246221"/>
             <a:chOff x="5943590" y="2801830"/>
             <a:chExt cx="1129871" cy="246221"/>
@@ -3905,12 +3906,12 @@
         </p:nvCxnSpPr>
         <p:spPr>
           <a:xfrm rot="16200000" flipH="1">
-            <a:off x="4903679" y="3888720"/>
-            <a:ext cx="1023855" cy="859138"/>
+            <a:off x="4506366" y="4179457"/>
+            <a:ext cx="1690196" cy="987423"/>
           </a:xfrm>
           <a:prstGeom prst="bentConnector3">
             <a:avLst>
-              <a:gd name="adj1" fmla="val 100004"/>
+              <a:gd name="adj1" fmla="val 99968"/>
             </a:avLst>
           </a:prstGeom>
           <a:ln w="19050">
@@ -3940,12 +3941,12 @@
         </p:nvCxnSpPr>
         <p:spPr>
           <a:xfrm rot="5400000">
-            <a:off x="6977455" y="3972108"/>
-            <a:ext cx="1069203" cy="647014"/>
+            <a:off x="6843341" y="4173280"/>
+            <a:ext cx="1690208" cy="999790"/>
           </a:xfrm>
           <a:prstGeom prst="bentConnector3">
             <a:avLst>
-              <a:gd name="adj1" fmla="val 99888"/>
+              <a:gd name="adj1" fmla="val 100014"/>
             </a:avLst>
           </a:prstGeom>
           <a:ln w="19050">
@@ -4068,7 +4069,7 @@
         </p:nvSpPr>
         <p:spPr>
           <a:xfrm>
-            <a:off x="4584896" y="4905175"/>
+            <a:off x="4584896" y="5593227"/>
             <a:ext cx="867545" cy="215444"/>
           </a:xfrm>
           <a:prstGeom prst="rect">
@@ -4098,7 +4099,7 @@
         </p:nvSpPr>
         <p:spPr>
           <a:xfrm>
-            <a:off x="7437063" y="4905175"/>
+            <a:off x="7437063" y="5593227"/>
             <a:ext cx="867545" cy="215444"/>
           </a:xfrm>
           <a:prstGeom prst="rect">
@@ -4129,7 +4130,7 @@
         <p:spPr>
           <a:xfrm>
             <a:off x="2809875" y="1562099"/>
-            <a:ext cx="6229350" cy="3762375"/>
+            <a:ext cx="6229350" cy="4404135"/>
           </a:xfrm>
           <a:prstGeom prst="roundRect">
             <a:avLst>
@@ -4454,6 +4455,287 @@
           </a:fontRef>
         </p:style>
       </p:cxnSp>
+      <p:grpSp>
+        <p:nvGrpSpPr>
+          <p:cNvPr id="2" name="Group 1"/>
+          <p:cNvGrpSpPr/>
+          <p:nvPr/>
+        </p:nvGrpSpPr>
+        <p:grpSpPr>
+          <a:xfrm>
+            <a:off x="6256340" y="3394487"/>
+            <a:ext cx="443102" cy="596498"/>
+            <a:chOff x="485274" y="654185"/>
+            <a:chExt cx="640080" cy="861667"/>
+          </a:xfrm>
+        </p:grpSpPr>
+        <p:sp>
+          <p:nvSpPr>
+            <p:cNvPr id="51" name="TextBox 50"/>
+            <p:cNvSpPr txBox="1"/>
+            <p:nvPr/>
+          </p:nvSpPr>
+          <p:spPr>
+            <a:xfrm>
+              <a:off x="485274" y="1360404"/>
+              <a:ext cx="640080" cy="155448"/>
+            </a:xfrm>
+            <a:prstGeom prst="rect">
+              <a:avLst/>
+            </a:prstGeom>
+            <a:noFill/>
+          </p:spPr>
+          <p:txBody>
+            <a:bodyPr wrap="square" lIns="0" tIns="0" rIns="0" bIns="0" rtlCol="0" anchor="t">
+              <a:noAutofit/>
+            </a:bodyPr>
+            <a:lstStyle/>
+            <a:p>
+              <a:pPr algn="ctr"/>
+              <a:r>
+                <a:rPr lang="en-US" sz="1000" b="1" spc="-50" dirty="0" smtClean="0"/>
+                <a:t>KMS</a:t>
+              </a:r>
+              <a:endParaRPr lang="en-US" sz="1000" b="1" spc="-50" dirty="0"/>
+            </a:p>
+          </p:txBody>
+        </p:sp>
+        <p:pic>
+          <p:nvPicPr>
+            <p:cNvPr id="52" name="Picture 51"/>
+            <p:cNvPicPr>
+              <a:picLocks noChangeAspect="1"/>
+            </p:cNvPicPr>
+            <p:nvPr/>
+          </p:nvPicPr>
+          <p:blipFill>
+            <a:blip r:embed="rId12" cstate="print">
+              <a:extLst>
+                <a:ext uri="{28A0092B-C50C-407E-A947-70E740481C1C}">
+                  <a14:useLocalDpi xmlns:a14="http://schemas.microsoft.com/office/drawing/2010/main" val="0"/>
+                </a:ext>
+              </a:extLst>
+            </a:blip>
+            <a:stretch>
+              <a:fillRect/>
+            </a:stretch>
+          </p:blipFill>
+          <p:spPr>
+            <a:xfrm>
+              <a:off x="532924" y="654185"/>
+              <a:ext cx="544780" cy="653736"/>
+            </a:xfrm>
+            <a:prstGeom prst="rect">
+              <a:avLst/>
+            </a:prstGeom>
+          </p:spPr>
+        </p:pic>
+      </p:grpSp>
+      <p:grpSp>
+        <p:nvGrpSpPr>
+          <p:cNvPr id="14" name="Group 13"/>
+          <p:cNvGrpSpPr/>
+          <p:nvPr/>
+        </p:nvGrpSpPr>
+        <p:grpSpPr>
+          <a:xfrm>
+            <a:off x="5917923" y="4028156"/>
+            <a:ext cx="1173256" cy="246221"/>
+            <a:chOff x="5895289" y="4039747"/>
+            <a:chExt cx="1173256" cy="246221"/>
+          </a:xfrm>
+        </p:grpSpPr>
+        <p:pic>
+          <p:nvPicPr>
+            <p:cNvPr id="60" name="Picture 59"/>
+            <p:cNvPicPr>
+              <a:picLocks noChangeAspect="1"/>
+            </p:cNvPicPr>
+            <p:nvPr/>
+          </p:nvPicPr>
+          <p:blipFill>
+            <a:blip r:embed="rId13" cstate="print">
+              <a:extLst>
+                <a:ext uri="{28A0092B-C50C-407E-A947-70E740481C1C}">
+                  <a14:useLocalDpi xmlns:a14="http://schemas.microsoft.com/office/drawing/2010/main" val="0"/>
+                </a:ext>
+              </a:extLst>
+            </a:blip>
+            <a:stretch>
+              <a:fillRect/>
+            </a:stretch>
+          </p:blipFill>
+          <p:spPr>
+            <a:xfrm>
+              <a:off x="5895289" y="4088805"/>
+              <a:ext cx="250638" cy="148104"/>
+            </a:xfrm>
+            <a:prstGeom prst="rect">
+              <a:avLst/>
+            </a:prstGeom>
+          </p:spPr>
+        </p:pic>
+        <p:sp>
+          <p:nvSpPr>
+            <p:cNvPr id="61" name="TextBox 60"/>
+            <p:cNvSpPr txBox="1"/>
+            <p:nvPr/>
+          </p:nvSpPr>
+          <p:spPr>
+            <a:xfrm>
+              <a:off x="6114438" y="4039747"/>
+              <a:ext cx="954107" cy="246221"/>
+            </a:xfrm>
+            <a:prstGeom prst="rect">
+              <a:avLst/>
+            </a:prstGeom>
+            <a:noFill/>
+          </p:spPr>
+          <p:txBody>
+            <a:bodyPr wrap="none" rtlCol="0">
+              <a:spAutoFit/>
+            </a:bodyPr>
+            <a:lstStyle/>
+            <a:p>
+              <a:r>
+                <a:rPr lang="en-US" sz="1000" dirty="0" err="1" smtClean="0"/>
+                <a:t>AdpMasterKey</a:t>
+              </a:r>
+              <a:endParaRPr lang="en-US" sz="1000" dirty="0"/>
+            </a:p>
+          </p:txBody>
+        </p:sp>
+      </p:grpSp>
+      <p:cxnSp>
+        <p:nvCxnSpPr>
+          <p:cNvPr id="63" name="Straight Arrow Connector 48"/>
+          <p:cNvCxnSpPr/>
+          <p:nvPr/>
+        </p:nvCxnSpPr>
+        <p:spPr>
+          <a:xfrm>
+            <a:off x="4997450" y="3837709"/>
+            <a:ext cx="801760" cy="313558"/>
+          </a:xfrm>
+          <a:prstGeom prst="bentConnector3">
+            <a:avLst>
+              <a:gd name="adj1" fmla="val 896"/>
+            </a:avLst>
+          </a:prstGeom>
+          <a:ln w="19050">
+            <a:tailEnd type="triangle"/>
+          </a:ln>
+        </p:spPr>
+        <p:style>
+          <a:lnRef idx="1">
+            <a:schemeClr val="dk1"/>
+          </a:lnRef>
+          <a:fillRef idx="0">
+            <a:schemeClr val="dk1"/>
+          </a:fillRef>
+          <a:effectRef idx="0">
+            <a:schemeClr val="dk1"/>
+          </a:effectRef>
+          <a:fontRef idx="minor">
+            <a:schemeClr val="tx1"/>
+          </a:fontRef>
+        </p:style>
+      </p:cxnSp>
+      <p:cxnSp>
+        <p:nvCxnSpPr>
+          <p:cNvPr id="65" name="Straight Arrow Connector 48"/>
+          <p:cNvCxnSpPr/>
+          <p:nvPr/>
+        </p:nvCxnSpPr>
+        <p:spPr>
+          <a:xfrm rot="10800000" flipV="1">
+            <a:off x="7084830" y="3837709"/>
+            <a:ext cx="939679" cy="313558"/>
+          </a:xfrm>
+          <a:prstGeom prst="bentConnector3">
+            <a:avLst>
+              <a:gd name="adj1" fmla="val 669"/>
+            </a:avLst>
+          </a:prstGeom>
+          <a:ln w="19050">
+            <a:tailEnd type="triangle"/>
+          </a:ln>
+        </p:spPr>
+        <p:style>
+          <a:lnRef idx="1">
+            <a:schemeClr val="dk1"/>
+          </a:lnRef>
+          <a:fillRef idx="0">
+            <a:schemeClr val="dk1"/>
+          </a:fillRef>
+          <a:effectRef idx="0">
+            <a:schemeClr val="dk1"/>
+          </a:effectRef>
+          <a:fontRef idx="minor">
+            <a:schemeClr val="tx1"/>
+          </a:fontRef>
+        </p:style>
+      </p:cxnSp>
+      <p:sp>
+        <p:nvSpPr>
+          <p:cNvPr id="82" name="TextBox 81"/>
+          <p:cNvSpPr txBox="1"/>
+          <p:nvPr/>
+        </p:nvSpPr>
+        <p:spPr>
+          <a:xfrm>
+            <a:off x="4958946" y="4169824"/>
+            <a:ext cx="878767" cy="215444"/>
+          </a:xfrm>
+          <a:prstGeom prst="rect">
+            <a:avLst/>
+          </a:prstGeom>
+          <a:noFill/>
+        </p:spPr>
+        <p:txBody>
+          <a:bodyPr wrap="none" rtlCol="0">
+            <a:spAutoFit/>
+          </a:bodyPr>
+          <a:lstStyle/>
+          <a:p>
+            <a:r>
+              <a:rPr lang="en-US" sz="800" dirty="0" smtClean="0"/>
+              <a:t>Encrypt data key</a:t>
+            </a:r>
+            <a:endParaRPr lang="en-US" sz="800" dirty="0"/>
+          </a:p>
+        </p:txBody>
+      </p:sp>
+      <p:sp>
+        <p:nvSpPr>
+          <p:cNvPr id="84" name="TextBox 83"/>
+          <p:cNvSpPr txBox="1"/>
+          <p:nvPr/>
+        </p:nvSpPr>
+        <p:spPr>
+          <a:xfrm>
+            <a:off x="7181087" y="4160905"/>
+            <a:ext cx="888385" cy="215444"/>
+          </a:xfrm>
+          <a:prstGeom prst="rect">
+            <a:avLst/>
+          </a:prstGeom>
+          <a:noFill/>
+        </p:spPr>
+        <p:txBody>
+          <a:bodyPr wrap="none" rtlCol="0">
+            <a:spAutoFit/>
+          </a:bodyPr>
+          <a:lstStyle/>
+          <a:p>
+            <a:r>
+              <a:rPr lang="en-US" sz="800" dirty="0" smtClean="0"/>
+              <a:t>Decrypt data key</a:t>
+            </a:r>
+            <a:endParaRPr lang="en-US" sz="800" dirty="0"/>
+          </a:p>
+        </p:txBody>
+      </p:sp>
     </p:spTree>
     <p:extLst>
       <p:ext uri="{BB962C8B-B14F-4D97-AF65-F5344CB8AC3E}">
@@ -4464,6 +4746,13 @@
   <p:clrMapOvr>
     <a:masterClrMapping/>
   </p:clrMapOvr>
+  <p:timing>
+    <p:tnLst>
+      <p:par>
+        <p:cTn id="1" dur="indefinite" restart="never" nodeType="tmRoot"/>
+      </p:par>
+    </p:tnLst>
+  </p:timing>
 </p:sld>
 </file>
 
@@ -4506,7 +4795,7 @@
         </p:blipFill>
         <p:spPr>
           <a:xfrm>
-            <a:off x="5018543" y="879664"/>
+            <a:off x="4199758" y="431205"/>
             <a:ext cx="506722" cy="526594"/>
           </a:xfrm>
           <a:prstGeom prst="rect">
@@ -4522,7 +4811,7 @@
         </p:nvGrpSpPr>
         <p:grpSpPr>
           <a:xfrm>
-            <a:off x="8181295" y="795802"/>
+            <a:off x="8466608" y="414802"/>
             <a:ext cx="770738" cy="694317"/>
             <a:chOff x="365197" y="709817"/>
             <a:chExt cx="894752" cy="806035"/>
@@ -4612,7 +4901,7 @@
         </p:blipFill>
         <p:spPr>
           <a:xfrm>
-            <a:off x="1784286" y="866559"/>
+            <a:off x="1784286" y="485559"/>
             <a:ext cx="539699" cy="539699"/>
           </a:xfrm>
           <a:prstGeom prst="rect">
@@ -4628,8 +4917,8 @@
         </p:nvSpPr>
         <p:spPr>
           <a:xfrm>
-            <a:off x="2982105" y="1811090"/>
-            <a:ext cx="1369286" cy="246221"/>
+            <a:off x="3259121" y="1430374"/>
+            <a:ext cx="1069524" cy="246221"/>
           </a:xfrm>
           <a:prstGeom prst="rect">
             <a:avLst/>
@@ -4645,7 +4934,15 @@
             <a:pPr algn="ctr"/>
             <a:r>
               <a:rPr lang="en-US" sz="1000" b="1" dirty="0" smtClean="0"/>
-              <a:t>(username, password)</a:t>
+              <a:t>(</a:t>
+            </a:r>
+            <a:r>
+              <a:rPr lang="en-US" sz="1000" b="1" dirty="0" smtClean="0"/>
+              <a:t>user, </a:t>
+            </a:r>
+            <a:r>
+              <a:rPr lang="en-US" sz="1000" b="1" dirty="0" smtClean="0"/>
+              <a:t>password)</a:t>
             </a:r>
             <a:endParaRPr lang="en-US" sz="1000" b="1" dirty="0"/>
           </a:p>
@@ -4659,7 +4956,7 @@
         </p:nvSpPr>
         <p:spPr>
           <a:xfrm>
-            <a:off x="701129" y="1949157"/>
+            <a:off x="701129" y="1568157"/>
             <a:ext cx="1276311" cy="246221"/>
           </a:xfrm>
           <a:prstGeom prst="rect">
@@ -4697,8 +4994,8 @@
         </p:nvSpPr>
         <p:spPr>
           <a:xfrm>
-            <a:off x="5382706" y="2074544"/>
-            <a:ext cx="1781257" cy="246221"/>
+            <a:off x="4513338" y="1653674"/>
+            <a:ext cx="1342034" cy="246221"/>
           </a:xfrm>
           <a:prstGeom prst="rect">
             <a:avLst/>
@@ -4713,7 +5010,15 @@
           <a:p>
             <a:r>
               <a:rPr lang="en-US" sz="1000" dirty="0" smtClean="0"/>
-              <a:t>Generate random AES-256 key</a:t>
+              <a:t>Generate </a:t>
+            </a:r>
+            <a:r>
+              <a:rPr lang="en-US" sz="1000" dirty="0" smtClean="0"/>
+              <a:t>AES-256 </a:t>
+            </a:r>
+            <a:r>
+              <a:rPr lang="en-US" sz="1000" dirty="0" smtClean="0"/>
+              <a:t>key</a:t>
             </a:r>
           </a:p>
         </p:txBody>
@@ -4726,8 +5031,8 @@
         </p:nvCxnSpPr>
         <p:spPr>
           <a:xfrm>
-            <a:off x="2203450" y="2073127"/>
-            <a:ext cx="2909094" cy="0"/>
+            <a:off x="2203450" y="1692127"/>
+            <a:ext cx="2147941" cy="0"/>
           </a:xfrm>
           <a:prstGeom prst="straightConnector1">
             <a:avLst/>
@@ -4759,8 +5064,8 @@
         </p:nvCxnSpPr>
         <p:spPr>
           <a:xfrm>
-            <a:off x="5332129" y="2945720"/>
-            <a:ext cx="3102259" cy="0"/>
+            <a:off x="4546981" y="2683482"/>
+            <a:ext cx="4210427" cy="0"/>
           </a:xfrm>
           <a:prstGeom prst="straightConnector1">
             <a:avLst/>
@@ -4792,7 +5097,7 @@
         </p:nvSpPr>
         <p:spPr>
           <a:xfrm>
-            <a:off x="5382706" y="2264433"/>
+            <a:off x="4516949" y="1825288"/>
             <a:ext cx="1109599" cy="246221"/>
           </a:xfrm>
           <a:prstGeom prst="rect">
@@ -4821,8 +5126,8 @@
         </p:nvSpPr>
         <p:spPr>
           <a:xfrm>
-            <a:off x="6042029" y="2700544"/>
-            <a:ext cx="1943161" cy="246221"/>
+            <a:off x="7104250" y="2437260"/>
+            <a:ext cx="1636987" cy="246221"/>
           </a:xfrm>
           <a:prstGeom prst="rect">
             <a:avLst/>
@@ -4837,15 +5142,15 @@
           <a:p>
             <a:r>
               <a:rPr lang="en-US" sz="1000" b="1" dirty="0" smtClean="0"/>
-              <a:t>(username, </a:t>
-            </a:r>
-            <a:r>
-              <a:rPr lang="en-US" sz="1000" b="1" dirty="0" err="1" smtClean="0"/>
-              <a:t>ciphertext</a:t>
+              <a:t>(</a:t>
             </a:r>
             <a:r>
               <a:rPr lang="en-US" sz="1000" b="1" dirty="0" smtClean="0"/>
-              <a:t> password)</a:t>
+              <a:t>user, encrypted password</a:t>
+            </a:r>
+            <a:r>
+              <a:rPr lang="en-US" sz="1000" b="1" dirty="0" smtClean="0"/>
+              <a:t>)</a:t>
             </a:r>
             <a:endParaRPr lang="en-US" sz="1000" b="1" dirty="0"/>
           </a:p>
@@ -4859,8 +5164,8 @@
         </p:nvCxnSpPr>
         <p:spPr>
           <a:xfrm flipH="1">
-            <a:off x="2203450" y="3156022"/>
-            <a:ext cx="2962296" cy="0"/>
+            <a:off x="2203450" y="2775022"/>
+            <a:ext cx="2147941" cy="0"/>
           </a:xfrm>
           <a:prstGeom prst="straightConnector1">
             <a:avLst/>
@@ -4884,68 +5189,6 @@
           </a:fontRef>
         </p:style>
       </p:cxnSp>
-      <p:sp>
-        <p:nvSpPr>
-          <p:cNvPr id="17" name="TextBox 16"/>
-          <p:cNvSpPr txBox="1"/>
-          <p:nvPr/>
-        </p:nvSpPr>
-        <p:spPr>
-          <a:xfrm>
-            <a:off x="3151010" y="2909801"/>
-            <a:ext cx="1055097" cy="246221"/>
-          </a:xfrm>
-          <a:prstGeom prst="rect">
-            <a:avLst/>
-          </a:prstGeom>
-          <a:noFill/>
-        </p:spPr>
-        <p:txBody>
-          <a:bodyPr wrap="none" rtlCol="0">
-            <a:spAutoFit/>
-          </a:bodyPr>
-          <a:lstStyle/>
-          <a:p>
-            <a:pPr algn="ctr"/>
-            <a:r>
-              <a:rPr lang="en-US" sz="1000" b="1" dirty="0" smtClean="0"/>
-              <a:t>(encryption key)</a:t>
-            </a:r>
-            <a:endParaRPr lang="en-US" sz="1000" b="1" dirty="0"/>
-          </a:p>
-        </p:txBody>
-      </p:sp>
-      <p:sp>
-        <p:nvSpPr>
-          <p:cNvPr id="37" name="TextBox 36"/>
-          <p:cNvSpPr txBox="1"/>
-          <p:nvPr/>
-        </p:nvSpPr>
-        <p:spPr>
-          <a:xfrm>
-            <a:off x="2674890" y="3587459"/>
-            <a:ext cx="1954381" cy="246221"/>
-          </a:xfrm>
-          <a:prstGeom prst="rect">
-            <a:avLst/>
-          </a:prstGeom>
-          <a:noFill/>
-        </p:spPr>
-        <p:txBody>
-          <a:bodyPr wrap="none" rtlCol="0">
-            <a:spAutoFit/>
-          </a:bodyPr>
-          <a:lstStyle/>
-          <a:p>
-            <a:pPr algn="ctr"/>
-            <a:r>
-              <a:rPr lang="en-US" sz="1000" b="1" dirty="0" smtClean="0"/>
-              <a:t>(username, encryption key, time)</a:t>
-            </a:r>
-            <a:endParaRPr lang="en-US" sz="1000" b="1" dirty="0"/>
-          </a:p>
-        </p:txBody>
-      </p:sp>
       <p:cxnSp>
         <p:nvCxnSpPr>
           <p:cNvPr id="38" name="Straight Arrow Connector 37"/>
@@ -4954,8 +5197,8 @@
         </p:nvCxnSpPr>
         <p:spPr>
           <a:xfrm>
-            <a:off x="2164556" y="3845388"/>
-            <a:ext cx="2947988" cy="0"/>
+            <a:off x="2164556" y="3464388"/>
+            <a:ext cx="2186835" cy="0"/>
           </a:xfrm>
           <a:prstGeom prst="straightConnector1">
             <a:avLst/>
@@ -4987,7 +5230,7 @@
         </p:nvSpPr>
         <p:spPr>
           <a:xfrm>
-            <a:off x="576925" y="3722277"/>
+            <a:off x="576925" y="3341277"/>
             <a:ext cx="1407758" cy="246221"/>
           </a:xfrm>
           <a:prstGeom prst="rect">
@@ -5025,8 +5268,8 @@
         </p:nvSpPr>
         <p:spPr>
           <a:xfrm>
-            <a:off x="5984240" y="4940244"/>
-            <a:ext cx="1943161" cy="246221"/>
+            <a:off x="4564100" y="5197367"/>
+            <a:ext cx="1345241" cy="246221"/>
           </a:xfrm>
           <a:prstGeom prst="rect">
             <a:avLst/>
@@ -5042,15 +5285,11 @@
             <a:pPr algn="ctr"/>
             <a:r>
               <a:rPr lang="en-US" sz="1000" b="1" dirty="0" smtClean="0"/>
-              <a:t>(username, </a:t>
-            </a:r>
-            <a:r>
-              <a:rPr lang="en-US" sz="1000" b="1" dirty="0" err="1" smtClean="0"/>
-              <a:t>ciphertext</a:t>
+              <a:t>(encrypted password</a:t>
             </a:r>
             <a:r>
               <a:rPr lang="en-US" sz="1000" b="1" dirty="0" smtClean="0"/>
-              <a:t> password)</a:t>
+              <a:t>)</a:t>
             </a:r>
             <a:endParaRPr lang="en-US" sz="1000" b="1" dirty="0"/>
           </a:p>
@@ -5064,8 +5303,8 @@
         </p:nvCxnSpPr>
         <p:spPr>
           <a:xfrm flipH="1">
-            <a:off x="5419726" y="5184762"/>
-            <a:ext cx="3014662" cy="0"/>
+            <a:off x="4546982" y="5185640"/>
+            <a:ext cx="4194255" cy="0"/>
           </a:xfrm>
           <a:prstGeom prst="straightConnector1">
             <a:avLst/>
@@ -5097,7 +5336,7 @@
         </p:nvSpPr>
         <p:spPr>
           <a:xfrm>
-            <a:off x="5368915" y="5299377"/>
+            <a:off x="4528726" y="5443588"/>
             <a:ext cx="1122423" cy="246221"/>
           </a:xfrm>
           <a:prstGeom prst="rect">
@@ -5140,7 +5379,7 @@
         </p:blipFill>
         <p:spPr>
           <a:xfrm>
-            <a:off x="10786345" y="703165"/>
+            <a:off x="10786345" y="322165"/>
             <a:ext cx="973016" cy="726376"/>
           </a:xfrm>
           <a:prstGeom prst="rect">
@@ -5156,14 +5395,15 @@
         </p:nvCxnSpPr>
         <p:spPr>
           <a:xfrm>
-            <a:off x="6796088" y="5707345"/>
-            <a:ext cx="4383733" cy="0"/>
+            <a:off x="5953125" y="5932222"/>
+            <a:ext cx="5224094" cy="0"/>
           </a:xfrm>
           <a:prstGeom prst="straightConnector1">
             <a:avLst/>
           </a:prstGeom>
           <a:ln w="19050">
-            <a:tailEnd type="triangle"/>
+            <a:headEnd type="none" w="med" len="med"/>
+            <a:tailEnd type="triangle" w="med" len="med"/>
           </a:ln>
         </p:spPr>
         <p:style>
@@ -5189,8 +5429,8 @@
         </p:nvSpPr>
         <p:spPr>
           <a:xfrm>
-            <a:off x="9234174" y="5454041"/>
-            <a:ext cx="1369286" cy="246221"/>
+            <a:off x="10107695" y="5679375"/>
+            <a:ext cx="1069524" cy="246221"/>
           </a:xfrm>
           <a:prstGeom prst="rect">
             <a:avLst/>
@@ -5206,7 +5446,49 @@
             <a:pPr algn="ctr"/>
             <a:r>
               <a:rPr lang="en-US" sz="1000" b="1" dirty="0" smtClean="0"/>
-              <a:t>(username, password)</a:t>
+              <a:t>(</a:t>
+            </a:r>
+            <a:r>
+              <a:rPr lang="en-US" sz="1000" b="1" dirty="0" smtClean="0"/>
+              <a:t>user, </a:t>
+            </a:r>
+            <a:r>
+              <a:rPr lang="en-US" sz="1000" b="1" dirty="0" smtClean="0"/>
+              <a:t>password)</a:t>
+            </a:r>
+            <a:endParaRPr lang="en-US" sz="1000" b="1" dirty="0"/>
+          </a:p>
+        </p:txBody>
+      </p:sp>
+      <p:sp>
+        <p:nvSpPr>
+          <p:cNvPr id="58" name="TextBox 57"/>
+          <p:cNvSpPr txBox="1"/>
+          <p:nvPr/>
+        </p:nvSpPr>
+        <p:spPr>
+          <a:xfrm>
+            <a:off x="4525433" y="5809111"/>
+            <a:ext cx="1386918" cy="246221"/>
+          </a:xfrm>
+          <a:prstGeom prst="rect">
+            <a:avLst/>
+          </a:prstGeom>
+          <a:noFill/>
+        </p:spPr>
+        <p:txBody>
+          <a:bodyPr wrap="none" rtlCol="0">
+            <a:spAutoFit/>
+          </a:bodyPr>
+          <a:lstStyle/>
+          <a:p>
+            <a:r>
+              <a:rPr lang="en-US" sz="1000" b="1" dirty="0" smtClean="0"/>
+              <a:t>POST</a:t>
+            </a:r>
+            <a:r>
+              <a:rPr lang="en-US" sz="1000" dirty="0" smtClean="0"/>
+              <a:t> adp.com/…/login</a:t>
             </a:r>
             <a:endParaRPr lang="en-US" sz="1000" b="1" dirty="0"/>
           </a:p>
@@ -5214,20 +5496,21 @@
       </p:sp>
       <p:cxnSp>
         <p:nvCxnSpPr>
-          <p:cNvPr id="53" name="Straight Arrow Connector 52"/>
+          <p:cNvPr id="60" name="Straight Arrow Connector 59"/>
           <p:cNvCxnSpPr/>
           <p:nvPr/>
         </p:nvCxnSpPr>
         <p:spPr>
-          <a:xfrm flipH="1">
-            <a:off x="5419725" y="5856880"/>
-            <a:ext cx="5742813" cy="0"/>
+          <a:xfrm>
+            <a:off x="6830599" y="6135724"/>
+            <a:ext cx="4346620" cy="0"/>
           </a:xfrm>
           <a:prstGeom prst="straightConnector1">
             <a:avLst/>
           </a:prstGeom>
           <a:ln w="19050">
-            <a:tailEnd type="triangle"/>
+            <a:headEnd type="none" w="med" len="med"/>
+            <a:tailEnd type="triangle" w="med" len="med"/>
           </a:ln>
         </p:spPr>
         <p:style>
@@ -5247,14 +5530,14 @@
       </p:cxnSp>
       <p:sp>
         <p:nvSpPr>
-          <p:cNvPr id="54" name="TextBox 53"/>
+          <p:cNvPr id="64" name="TextBox 63"/>
           <p:cNvSpPr txBox="1"/>
           <p:nvPr/>
         </p:nvSpPr>
         <p:spPr>
           <a:xfrm>
-            <a:off x="6444105" y="5851893"/>
-            <a:ext cx="989373" cy="246221"/>
+            <a:off x="4520070" y="6008240"/>
+            <a:ext cx="2262158" cy="246221"/>
           </a:xfrm>
           <a:prstGeom prst="rect">
             <a:avLst/>
@@ -5269,134 +5552,6 @@
           <a:p>
             <a:r>
               <a:rPr lang="en-US" sz="1000" b="1" dirty="0" smtClean="0"/>
-              <a:t>(session token)</a:t>
-            </a:r>
-            <a:endParaRPr lang="en-US" sz="1000" b="1" dirty="0"/>
-          </a:p>
-        </p:txBody>
-      </p:sp>
-      <p:sp>
-        <p:nvSpPr>
-          <p:cNvPr id="58" name="TextBox 57"/>
-          <p:cNvSpPr txBox="1"/>
-          <p:nvPr/>
-        </p:nvSpPr>
-        <p:spPr>
-          <a:xfrm>
-            <a:off x="5365424" y="5583389"/>
-            <a:ext cx="1386918" cy="246221"/>
-          </a:xfrm>
-          <a:prstGeom prst="rect">
-            <a:avLst/>
-          </a:prstGeom>
-          <a:noFill/>
-        </p:spPr>
-        <p:txBody>
-          <a:bodyPr wrap="none" rtlCol="0">
-            <a:spAutoFit/>
-          </a:bodyPr>
-          <a:lstStyle/>
-          <a:p>
-            <a:r>
-              <a:rPr lang="en-US" sz="1000" b="1" dirty="0" smtClean="0"/>
-              <a:t>POST</a:t>
-            </a:r>
-            <a:r>
-              <a:rPr lang="en-US" sz="1000" dirty="0" smtClean="0"/>
-              <a:t> adp.com/…/login</a:t>
-            </a:r>
-            <a:endParaRPr lang="en-US" sz="1000" b="1" dirty="0"/>
-          </a:p>
-        </p:txBody>
-      </p:sp>
-      <p:sp>
-        <p:nvSpPr>
-          <p:cNvPr id="59" name="TextBox 58"/>
-          <p:cNvSpPr txBox="1"/>
-          <p:nvPr/>
-        </p:nvSpPr>
-        <p:spPr>
-          <a:xfrm>
-            <a:off x="9065196" y="6070626"/>
-            <a:ext cx="1709122" cy="246221"/>
-          </a:xfrm>
-          <a:prstGeom prst="rect">
-            <a:avLst/>
-          </a:prstGeom>
-          <a:noFill/>
-        </p:spPr>
-        <p:txBody>
-          <a:bodyPr wrap="none" rtlCol="0">
-            <a:spAutoFit/>
-          </a:bodyPr>
-          <a:lstStyle/>
-          <a:p>
-            <a:pPr algn="ctr"/>
-            <a:r>
-              <a:rPr lang="en-US" sz="1000" b="1" dirty="0" smtClean="0"/>
-              <a:t>(session token, employee id)</a:t>
-            </a:r>
-            <a:endParaRPr lang="en-US" sz="1000" b="1" dirty="0"/>
-          </a:p>
-        </p:txBody>
-      </p:sp>
-      <p:cxnSp>
-        <p:nvCxnSpPr>
-          <p:cNvPr id="60" name="Straight Arrow Connector 59"/>
-          <p:cNvCxnSpPr/>
-          <p:nvPr/>
-        </p:nvCxnSpPr>
-        <p:spPr>
-          <a:xfrm>
-            <a:off x="7667625" y="6320416"/>
-            <a:ext cx="3509594" cy="0"/>
-          </a:xfrm>
-          <a:prstGeom prst="straightConnector1">
-            <a:avLst/>
-          </a:prstGeom>
-          <a:ln w="19050">
-            <a:tailEnd type="triangle"/>
-          </a:ln>
-        </p:spPr>
-        <p:style>
-          <a:lnRef idx="1">
-            <a:schemeClr val="dk1"/>
-          </a:lnRef>
-          <a:fillRef idx="0">
-            <a:schemeClr val="dk1"/>
-          </a:fillRef>
-          <a:effectRef idx="0">
-            <a:schemeClr val="dk1"/>
-          </a:effectRef>
-          <a:fontRef idx="minor">
-            <a:schemeClr val="tx1"/>
-          </a:fontRef>
-        </p:style>
-      </p:cxnSp>
-      <p:sp>
-        <p:nvSpPr>
-          <p:cNvPr id="64" name="TextBox 63"/>
-          <p:cNvSpPr txBox="1"/>
-          <p:nvPr/>
-        </p:nvSpPr>
-        <p:spPr>
-          <a:xfrm>
-            <a:off x="5364125" y="6197306"/>
-            <a:ext cx="2262158" cy="246221"/>
-          </a:xfrm>
-          <a:prstGeom prst="rect">
-            <a:avLst/>
-          </a:prstGeom>
-          <a:noFill/>
-        </p:spPr>
-        <p:txBody>
-          <a:bodyPr wrap="none" rtlCol="0">
-            <a:spAutoFit/>
-          </a:bodyPr>
-          <a:lstStyle/>
-          <a:p>
-            <a:r>
-              <a:rPr lang="en-US" sz="1000" b="1" dirty="0" smtClean="0"/>
               <a:t>POST</a:t>
             </a:r>
             <a:r>
@@ -5419,7 +5574,7 @@
         </p:nvSpPr>
         <p:spPr>
           <a:xfrm>
-            <a:off x="5187990" y="2078582"/>
+            <a:off x="4373675" y="1697582"/>
             <a:ext cx="144139" cy="1083754"/>
           </a:xfrm>
           <a:prstGeom prst="rect">
@@ -5472,8 +5627,8 @@
         </p:nvCxnSpPr>
         <p:spPr>
           <a:xfrm>
-            <a:off x="2054134" y="1591194"/>
-            <a:ext cx="0" cy="4593706"/>
+            <a:off x="2054134" y="1210194"/>
+            <a:ext cx="0" cy="5044267"/>
           </a:xfrm>
           <a:prstGeom prst="line">
             <a:avLst/>
@@ -5511,7 +5666,7 @@
         </p:nvSpPr>
         <p:spPr>
           <a:xfrm>
-            <a:off x="1990244" y="2072268"/>
+            <a:off x="1990244" y="1691268"/>
             <a:ext cx="144139" cy="1083754"/>
           </a:xfrm>
           <a:prstGeom prst="rect">
@@ -5564,8 +5719,8 @@
         </p:nvCxnSpPr>
         <p:spPr>
           <a:xfrm>
-            <a:off x="8566661" y="1672585"/>
-            <a:ext cx="0" cy="3626792"/>
+            <a:off x="8851974" y="1291585"/>
+            <a:ext cx="0" cy="4030058"/>
           </a:xfrm>
           <a:prstGeom prst="line">
             <a:avLst/>
@@ -5603,7 +5758,7 @@
         </p:nvSpPr>
         <p:spPr>
           <a:xfrm>
-            <a:off x="1984683" y="3797762"/>
+            <a:off x="1984683" y="3416762"/>
             <a:ext cx="144139" cy="104058"/>
           </a:xfrm>
           <a:prstGeom prst="rect">
@@ -5656,8 +5811,8 @@
         </p:nvCxnSpPr>
         <p:spPr>
           <a:xfrm>
-            <a:off x="11272852" y="1659725"/>
-            <a:ext cx="0" cy="4865375"/>
+            <a:off x="11272852" y="1273962"/>
+            <a:ext cx="0" cy="4980499"/>
           </a:xfrm>
           <a:prstGeom prst="line">
             <a:avLst/>
@@ -5695,8 +5850,8 @@
         </p:nvSpPr>
         <p:spPr>
           <a:xfrm>
-            <a:off x="11195518" y="5707345"/>
-            <a:ext cx="144139" cy="144548"/>
+            <a:off x="11195518" y="5859947"/>
+            <a:ext cx="144139" cy="355116"/>
           </a:xfrm>
           <a:prstGeom prst="rect">
             <a:avLst/>
@@ -5737,24 +5892,29 @@
       </p:sp>
       <p:sp>
         <p:nvSpPr>
-          <p:cNvPr id="101" name="Rectangle 100"/>
+          <p:cNvPr id="82" name="Rectangle 81"/>
           <p:cNvSpPr/>
           <p:nvPr/>
         </p:nvSpPr>
         <p:spPr>
           <a:xfrm>
-            <a:off x="11195518" y="6320416"/>
-            <a:ext cx="144139" cy="192821"/>
+            <a:off x="4381294" y="3416762"/>
+            <a:ext cx="144139" cy="104058"/>
           </a:xfrm>
           <a:prstGeom prst="rect">
             <a:avLst/>
           </a:prstGeom>
           <a:solidFill>
-            <a:srgbClr val="FFCCCC"/>
+            <a:schemeClr val="accent2">
+              <a:lumMod val="20000"/>
+              <a:lumOff val="80000"/>
+            </a:schemeClr>
           </a:solidFill>
           <a:ln>
             <a:solidFill>
-              <a:srgbClr val="CC0000"/>
+              <a:schemeClr val="accent2">
+                <a:lumMod val="50000"/>
+              </a:schemeClr>
             </a:solidFill>
           </a:ln>
         </p:spPr>
@@ -5783,80 +5943,122 @@
           </a:p>
         </p:txBody>
       </p:sp>
-      <p:cxnSp>
-        <p:nvCxnSpPr>
-          <p:cNvPr id="106" name="Straight Arrow Connector 105"/>
-          <p:cNvCxnSpPr/>
+      <p:sp>
+        <p:nvSpPr>
+          <p:cNvPr id="117" name="Rectangle 116"/>
+          <p:cNvSpPr/>
           <p:nvPr/>
-        </p:nvCxnSpPr>
-        <p:spPr>
-          <a:xfrm flipH="1">
-            <a:off x="5419725" y="6506153"/>
-            <a:ext cx="5736265" cy="0"/>
-          </a:xfrm>
-          <a:prstGeom prst="straightConnector1">
-            <a:avLst/>
-          </a:prstGeom>
-          <a:ln w="19050">
-            <a:tailEnd type="triangle"/>
-          </a:ln>
-        </p:spPr>
-        <p:style>
-          <a:lnRef idx="1">
-            <a:schemeClr val="dk1"/>
-          </a:lnRef>
-          <a:fillRef idx="0">
-            <a:schemeClr val="dk1"/>
-          </a:fillRef>
-          <a:effectRef idx="0">
-            <a:schemeClr val="dk1"/>
-          </a:effectRef>
-          <a:fontRef idx="minor">
-            <a:schemeClr val="tx1"/>
-          </a:fontRef>
-        </p:style>
-      </p:cxnSp>
-      <p:sp>
-        <p:nvSpPr>
-          <p:cNvPr id="109" name="TextBox 108"/>
-          <p:cNvSpPr txBox="1"/>
-          <p:nvPr/>
-        </p:nvSpPr>
-        <p:spPr>
-          <a:xfrm>
-            <a:off x="6472931" y="6513237"/>
-            <a:ext cx="878767" cy="246221"/>
+        </p:nvSpPr>
+        <p:spPr>
+          <a:xfrm>
+            <a:off x="8779904" y="2619197"/>
+            <a:ext cx="144139" cy="146889"/>
           </a:xfrm>
           <a:prstGeom prst="rect">
             <a:avLst/>
           </a:prstGeom>
-          <a:noFill/>
-        </p:spPr>
-        <p:txBody>
-          <a:bodyPr wrap="none" rtlCol="0">
-            <a:spAutoFit/>
-          </a:bodyPr>
+          <a:solidFill>
+            <a:schemeClr val="accent1">
+              <a:lumMod val="40000"/>
+              <a:lumOff val="60000"/>
+            </a:schemeClr>
+          </a:solidFill>
+          <a:ln>
+            <a:solidFill>
+              <a:schemeClr val="accent1">
+                <a:lumMod val="75000"/>
+              </a:schemeClr>
+            </a:solidFill>
+          </a:ln>
+        </p:spPr>
+        <p:style>
+          <a:lnRef idx="2">
+            <a:schemeClr val="accent1">
+              <a:shade val="50000"/>
+            </a:schemeClr>
+          </a:lnRef>
+          <a:fillRef idx="1">
+            <a:schemeClr val="accent1"/>
+          </a:fillRef>
+          <a:effectRef idx="0">
+            <a:schemeClr val="accent1"/>
+          </a:effectRef>
+          <a:fontRef idx="minor">
+            <a:schemeClr val="lt1"/>
+          </a:fontRef>
+        </p:style>
+        <p:txBody>
+          <a:bodyPr rtlCol="0" anchor="ctr"/>
           <a:lstStyle/>
           <a:p>
             <a:pPr algn="ctr"/>
-            <a:r>
-              <a:rPr lang="en-US" sz="1000" b="1" dirty="0" smtClean="0"/>
-              <a:t>(success/fail)</a:t>
-            </a:r>
-            <a:endParaRPr lang="en-US" sz="1000" b="1" dirty="0"/>
-          </a:p>
-        </p:txBody>
-      </p:sp>
-      <p:sp>
-        <p:nvSpPr>
-          <p:cNvPr id="82" name="Rectangle 81"/>
+            <a:endParaRPr lang="en-US"/>
+          </a:p>
+        </p:txBody>
+      </p:sp>
+      <p:sp>
+        <p:nvSpPr>
+          <p:cNvPr id="119" name="Rectangle 118"/>
           <p:cNvSpPr/>
           <p:nvPr/>
         </p:nvSpPr>
         <p:spPr>
           <a:xfrm>
-            <a:off x="5195609" y="3797762"/>
-            <a:ext cx="144139" cy="104058"/>
+            <a:off x="8779904" y="5112195"/>
+            <a:ext cx="144139" cy="146889"/>
+          </a:xfrm>
+          <a:prstGeom prst="rect">
+            <a:avLst/>
+          </a:prstGeom>
+          <a:solidFill>
+            <a:schemeClr val="accent1">
+              <a:lumMod val="40000"/>
+              <a:lumOff val="60000"/>
+            </a:schemeClr>
+          </a:solidFill>
+          <a:ln>
+            <a:solidFill>
+              <a:schemeClr val="accent1">
+                <a:lumMod val="75000"/>
+              </a:schemeClr>
+            </a:solidFill>
+          </a:ln>
+        </p:spPr>
+        <p:style>
+          <a:lnRef idx="2">
+            <a:schemeClr val="accent1">
+              <a:shade val="50000"/>
+            </a:schemeClr>
+          </a:lnRef>
+          <a:fillRef idx="1">
+            <a:schemeClr val="accent1"/>
+          </a:fillRef>
+          <a:effectRef idx="0">
+            <a:schemeClr val="accent1"/>
+          </a:effectRef>
+          <a:fontRef idx="minor">
+            <a:schemeClr val="lt1"/>
+          </a:fontRef>
+        </p:style>
+        <p:txBody>
+          <a:bodyPr rtlCol="0" anchor="ctr"/>
+          <a:lstStyle/>
+          <a:p>
+            <a:pPr algn="ctr"/>
+            <a:endParaRPr lang="en-US"/>
+          </a:p>
+        </p:txBody>
+      </p:sp>
+      <p:sp>
+        <p:nvSpPr>
+          <p:cNvPr id="121" name="Rectangle 120"/>
+          <p:cNvSpPr/>
+          <p:nvPr/>
+        </p:nvSpPr>
+        <p:spPr>
+          <a:xfrm>
+            <a:off x="4381294" y="4717685"/>
+            <a:ext cx="144139" cy="1536776"/>
           </a:xfrm>
           <a:prstGeom prst="rect">
             <a:avLst/>
@@ -5900,165 +6102,6 @@
           </a:p>
         </p:txBody>
       </p:sp>
-      <p:sp>
-        <p:nvSpPr>
-          <p:cNvPr id="117" name="Rectangle 116"/>
-          <p:cNvSpPr/>
-          <p:nvPr/>
-        </p:nvSpPr>
-        <p:spPr>
-          <a:xfrm>
-            <a:off x="8494591" y="2869681"/>
-            <a:ext cx="144139" cy="146889"/>
-          </a:xfrm>
-          <a:prstGeom prst="rect">
-            <a:avLst/>
-          </a:prstGeom>
-          <a:solidFill>
-            <a:schemeClr val="accent1">
-              <a:lumMod val="40000"/>
-              <a:lumOff val="60000"/>
-            </a:schemeClr>
-          </a:solidFill>
-          <a:ln>
-            <a:solidFill>
-              <a:schemeClr val="accent1">
-                <a:lumMod val="75000"/>
-              </a:schemeClr>
-            </a:solidFill>
-          </a:ln>
-        </p:spPr>
-        <p:style>
-          <a:lnRef idx="2">
-            <a:schemeClr val="accent1">
-              <a:shade val="50000"/>
-            </a:schemeClr>
-          </a:lnRef>
-          <a:fillRef idx="1">
-            <a:schemeClr val="accent1"/>
-          </a:fillRef>
-          <a:effectRef idx="0">
-            <a:schemeClr val="accent1"/>
-          </a:effectRef>
-          <a:fontRef idx="minor">
-            <a:schemeClr val="lt1"/>
-          </a:fontRef>
-        </p:style>
-        <p:txBody>
-          <a:bodyPr rtlCol="0" anchor="ctr"/>
-          <a:lstStyle/>
-          <a:p>
-            <a:pPr algn="ctr"/>
-            <a:endParaRPr lang="en-US"/>
-          </a:p>
-        </p:txBody>
-      </p:sp>
-      <p:sp>
-        <p:nvSpPr>
-          <p:cNvPr id="119" name="Rectangle 118"/>
-          <p:cNvSpPr/>
-          <p:nvPr/>
-        </p:nvSpPr>
-        <p:spPr>
-          <a:xfrm>
-            <a:off x="8494591" y="5105872"/>
-            <a:ext cx="144139" cy="146889"/>
-          </a:xfrm>
-          <a:prstGeom prst="rect">
-            <a:avLst/>
-          </a:prstGeom>
-          <a:solidFill>
-            <a:schemeClr val="accent1">
-              <a:lumMod val="40000"/>
-              <a:lumOff val="60000"/>
-            </a:schemeClr>
-          </a:solidFill>
-          <a:ln>
-            <a:solidFill>
-              <a:schemeClr val="accent1">
-                <a:lumMod val="75000"/>
-              </a:schemeClr>
-            </a:solidFill>
-          </a:ln>
-        </p:spPr>
-        <p:style>
-          <a:lnRef idx="2">
-            <a:schemeClr val="accent1">
-              <a:shade val="50000"/>
-            </a:schemeClr>
-          </a:lnRef>
-          <a:fillRef idx="1">
-            <a:schemeClr val="accent1"/>
-          </a:fillRef>
-          <a:effectRef idx="0">
-            <a:schemeClr val="accent1"/>
-          </a:effectRef>
-          <a:fontRef idx="minor">
-            <a:schemeClr val="lt1"/>
-          </a:fontRef>
-        </p:style>
-        <p:txBody>
-          <a:bodyPr rtlCol="0" anchor="ctr"/>
-          <a:lstStyle/>
-          <a:p>
-            <a:pPr algn="ctr"/>
-            <a:endParaRPr lang="en-US"/>
-          </a:p>
-        </p:txBody>
-      </p:sp>
-      <p:sp>
-        <p:nvSpPr>
-          <p:cNvPr id="121" name="Rectangle 120"/>
-          <p:cNvSpPr/>
-          <p:nvPr/>
-        </p:nvSpPr>
-        <p:spPr>
-          <a:xfrm>
-            <a:off x="5195609" y="5098685"/>
-            <a:ext cx="144139" cy="1414552"/>
-          </a:xfrm>
-          <a:prstGeom prst="rect">
-            <a:avLst/>
-          </a:prstGeom>
-          <a:solidFill>
-            <a:schemeClr val="accent2">
-              <a:lumMod val="20000"/>
-              <a:lumOff val="80000"/>
-            </a:schemeClr>
-          </a:solidFill>
-          <a:ln>
-            <a:solidFill>
-              <a:schemeClr val="accent2">
-                <a:lumMod val="50000"/>
-              </a:schemeClr>
-            </a:solidFill>
-          </a:ln>
-        </p:spPr>
-        <p:style>
-          <a:lnRef idx="2">
-            <a:schemeClr val="accent1">
-              <a:shade val="50000"/>
-            </a:schemeClr>
-          </a:lnRef>
-          <a:fillRef idx="1">
-            <a:schemeClr val="accent1"/>
-          </a:fillRef>
-          <a:effectRef idx="0">
-            <a:schemeClr val="accent1"/>
-          </a:effectRef>
-          <a:fontRef idx="minor">
-            <a:schemeClr val="lt1"/>
-          </a:fontRef>
-        </p:style>
-        <p:txBody>
-          <a:bodyPr rtlCol="0" anchor="ctr"/>
-          <a:lstStyle/>
-          <a:p>
-            <a:pPr algn="ctr"/>
-            <a:endParaRPr lang="en-US"/>
-          </a:p>
-        </p:txBody>
-      </p:sp>
       <p:grpSp>
         <p:nvGrpSpPr>
           <p:cNvPr id="122" name="Group 121"/>
@@ -6067,7 +6110,7 @@
         </p:nvGrpSpPr>
         <p:grpSpPr>
           <a:xfrm>
-            <a:off x="4928366" y="4210932"/>
+            <a:off x="4114051" y="3829932"/>
             <a:ext cx="678138" cy="578628"/>
             <a:chOff x="344931" y="710759"/>
             <a:chExt cx="943550" cy="805093"/>
@@ -6143,7 +6186,7 @@
         </p:nvSpPr>
         <p:spPr>
           <a:xfrm>
-            <a:off x="5361296" y="3725340"/>
+            <a:off x="4525433" y="3343422"/>
             <a:ext cx="1754006" cy="246221"/>
           </a:xfrm>
           <a:prstGeom prst="rect">
@@ -6185,7 +6228,7 @@
         </p:nvSpPr>
         <p:spPr>
           <a:xfrm>
-            <a:off x="3768615" y="4982761"/>
+            <a:off x="2954300" y="4601761"/>
             <a:ext cx="1426994" cy="246221"/>
           </a:xfrm>
           <a:prstGeom prst="rect">
@@ -6206,6 +6249,686 @@
           </a:p>
         </p:txBody>
       </p:sp>
+      <p:grpSp>
+        <p:nvGrpSpPr>
+          <p:cNvPr id="50" name="Group 49"/>
+          <p:cNvGrpSpPr/>
+          <p:nvPr/>
+        </p:nvGrpSpPr>
+        <p:grpSpPr>
+          <a:xfrm>
+            <a:off x="6325283" y="414802"/>
+            <a:ext cx="527872" cy="710614"/>
+            <a:chOff x="485274" y="654185"/>
+            <a:chExt cx="640080" cy="861667"/>
+          </a:xfrm>
+        </p:grpSpPr>
+        <p:sp>
+          <p:nvSpPr>
+            <p:cNvPr id="51" name="TextBox 50"/>
+            <p:cNvSpPr txBox="1"/>
+            <p:nvPr/>
+          </p:nvSpPr>
+          <p:spPr>
+            <a:xfrm>
+              <a:off x="485274" y="1360404"/>
+              <a:ext cx="640080" cy="155448"/>
+            </a:xfrm>
+            <a:prstGeom prst="rect">
+              <a:avLst/>
+            </a:prstGeom>
+            <a:noFill/>
+          </p:spPr>
+          <p:txBody>
+            <a:bodyPr wrap="square" lIns="0" tIns="0" rIns="0" bIns="0" rtlCol="0" anchor="t">
+              <a:noAutofit/>
+            </a:bodyPr>
+            <a:lstStyle/>
+            <a:p>
+              <a:pPr algn="ctr"/>
+              <a:r>
+                <a:rPr lang="en-US" sz="1000" b="1" spc="-50" dirty="0" smtClean="0"/>
+                <a:t>KMS</a:t>
+              </a:r>
+              <a:endParaRPr lang="en-US" sz="1000" b="1" spc="-50" dirty="0"/>
+            </a:p>
+          </p:txBody>
+        </p:sp>
+        <p:pic>
+          <p:nvPicPr>
+            <p:cNvPr id="52" name="Picture 51"/>
+            <p:cNvPicPr>
+              <a:picLocks noChangeAspect="1"/>
+            </p:cNvPicPr>
+            <p:nvPr/>
+          </p:nvPicPr>
+          <p:blipFill>
+            <a:blip r:embed="rId7" cstate="print">
+              <a:extLst>
+                <a:ext uri="{28A0092B-C50C-407E-A947-70E740481C1C}">
+                  <a14:useLocalDpi xmlns:a14="http://schemas.microsoft.com/office/drawing/2010/main" val="0"/>
+                </a:ext>
+              </a:extLst>
+            </a:blip>
+            <a:stretch>
+              <a:fillRect/>
+            </a:stretch>
+          </p:blipFill>
+          <p:spPr>
+            <a:xfrm>
+              <a:off x="532924" y="654185"/>
+              <a:ext cx="544780" cy="653736"/>
+            </a:xfrm>
+            <a:prstGeom prst="rect">
+              <a:avLst/>
+            </a:prstGeom>
+          </p:spPr>
+        </p:pic>
+      </p:grpSp>
+      <p:cxnSp>
+        <p:nvCxnSpPr>
+          <p:cNvPr id="53" name="Straight Connector 52"/>
+          <p:cNvCxnSpPr/>
+          <p:nvPr/>
+        </p:nvCxnSpPr>
+        <p:spPr>
+          <a:xfrm>
+            <a:off x="6578371" y="1290022"/>
+            <a:ext cx="0" cy="3626792"/>
+          </a:xfrm>
+          <a:prstGeom prst="line">
+            <a:avLst/>
+          </a:prstGeom>
+          <a:ln w="12700">
+            <a:solidFill>
+              <a:schemeClr val="tx1">
+                <a:lumMod val="50000"/>
+                <a:lumOff val="50000"/>
+              </a:schemeClr>
+            </a:solidFill>
+            <a:prstDash val="dash"/>
+          </a:ln>
+        </p:spPr>
+        <p:style>
+          <a:lnRef idx="1">
+            <a:schemeClr val="accent1"/>
+          </a:lnRef>
+          <a:fillRef idx="0">
+            <a:schemeClr val="accent1"/>
+          </a:fillRef>
+          <a:effectRef idx="0">
+            <a:schemeClr val="accent1"/>
+          </a:effectRef>
+          <a:fontRef idx="minor">
+            <a:schemeClr val="tx1"/>
+          </a:fontRef>
+        </p:style>
+      </p:cxnSp>
+      <p:sp>
+        <p:nvSpPr>
+          <p:cNvPr id="55" name="Rectangle 54"/>
+          <p:cNvSpPr/>
+          <p:nvPr/>
+        </p:nvSpPr>
+        <p:spPr>
+          <a:xfrm>
+            <a:off x="6514604" y="2171903"/>
+            <a:ext cx="144139" cy="146889"/>
+          </a:xfrm>
+          <a:prstGeom prst="rect">
+            <a:avLst/>
+          </a:prstGeom>
+          <a:solidFill>
+            <a:schemeClr val="accent6">
+              <a:lumMod val="40000"/>
+              <a:lumOff val="60000"/>
+            </a:schemeClr>
+          </a:solidFill>
+          <a:ln>
+            <a:solidFill>
+              <a:schemeClr val="accent6">
+                <a:lumMod val="50000"/>
+              </a:schemeClr>
+            </a:solidFill>
+          </a:ln>
+        </p:spPr>
+        <p:style>
+          <a:lnRef idx="2">
+            <a:schemeClr val="accent1">
+              <a:shade val="50000"/>
+            </a:schemeClr>
+          </a:lnRef>
+          <a:fillRef idx="1">
+            <a:schemeClr val="accent1"/>
+          </a:fillRef>
+          <a:effectRef idx="0">
+            <a:schemeClr val="accent1"/>
+          </a:effectRef>
+          <a:fontRef idx="minor">
+            <a:schemeClr val="lt1"/>
+          </a:fontRef>
+        </p:style>
+        <p:txBody>
+          <a:bodyPr rtlCol="0" anchor="ctr"/>
+          <a:lstStyle/>
+          <a:p>
+            <a:pPr algn="ctr"/>
+            <a:endParaRPr lang="en-US"/>
+          </a:p>
+        </p:txBody>
+      </p:sp>
+      <p:cxnSp>
+        <p:nvCxnSpPr>
+          <p:cNvPr id="61" name="Straight Arrow Connector 60"/>
+          <p:cNvCxnSpPr/>
+          <p:nvPr/>
+        </p:nvCxnSpPr>
+        <p:spPr>
+          <a:xfrm>
+            <a:off x="4586288" y="2245347"/>
+            <a:ext cx="1908916" cy="0"/>
+          </a:xfrm>
+          <a:prstGeom prst="straightConnector1">
+            <a:avLst/>
+          </a:prstGeom>
+          <a:ln w="19050">
+            <a:headEnd type="none" w="med" len="med"/>
+            <a:tailEnd type="triangle" w="med" len="med"/>
+          </a:ln>
+        </p:spPr>
+        <p:style>
+          <a:lnRef idx="1">
+            <a:schemeClr val="dk1"/>
+          </a:lnRef>
+          <a:fillRef idx="0">
+            <a:schemeClr val="dk1"/>
+          </a:fillRef>
+          <a:effectRef idx="0">
+            <a:schemeClr val="dk1"/>
+          </a:effectRef>
+          <a:fontRef idx="minor">
+            <a:schemeClr val="tx1"/>
+          </a:fontRef>
+        </p:style>
+      </p:cxnSp>
+      <p:sp>
+        <p:nvSpPr>
+          <p:cNvPr id="66" name="Rectangle 65"/>
+          <p:cNvSpPr/>
+          <p:nvPr/>
+        </p:nvSpPr>
+        <p:spPr>
+          <a:xfrm>
+            <a:off x="6514604" y="4728466"/>
+            <a:ext cx="144139" cy="146889"/>
+          </a:xfrm>
+          <a:prstGeom prst="rect">
+            <a:avLst/>
+          </a:prstGeom>
+          <a:solidFill>
+            <a:schemeClr val="accent6">
+              <a:lumMod val="40000"/>
+              <a:lumOff val="60000"/>
+            </a:schemeClr>
+          </a:solidFill>
+          <a:ln>
+            <a:solidFill>
+              <a:schemeClr val="accent6">
+                <a:lumMod val="50000"/>
+              </a:schemeClr>
+            </a:solidFill>
+          </a:ln>
+        </p:spPr>
+        <p:style>
+          <a:lnRef idx="2">
+            <a:schemeClr val="accent1">
+              <a:shade val="50000"/>
+            </a:schemeClr>
+          </a:lnRef>
+          <a:fillRef idx="1">
+            <a:schemeClr val="accent1"/>
+          </a:fillRef>
+          <a:effectRef idx="0">
+            <a:schemeClr val="accent1"/>
+          </a:effectRef>
+          <a:fontRef idx="minor">
+            <a:schemeClr val="lt1"/>
+          </a:fontRef>
+        </p:style>
+        <p:txBody>
+          <a:bodyPr rtlCol="0" anchor="ctr"/>
+          <a:lstStyle/>
+          <a:p>
+            <a:pPr algn="ctr"/>
+            <a:endParaRPr lang="en-US"/>
+          </a:p>
+        </p:txBody>
+      </p:sp>
+      <p:cxnSp>
+        <p:nvCxnSpPr>
+          <p:cNvPr id="67" name="Straight Arrow Connector 66"/>
+          <p:cNvCxnSpPr/>
+          <p:nvPr/>
+        </p:nvCxnSpPr>
+        <p:spPr>
+          <a:xfrm>
+            <a:off x="4586288" y="4789211"/>
+            <a:ext cx="1908916" cy="0"/>
+          </a:xfrm>
+          <a:prstGeom prst="straightConnector1">
+            <a:avLst/>
+          </a:prstGeom>
+          <a:ln w="19050">
+            <a:headEnd type="none" w="med" len="med"/>
+            <a:tailEnd type="triangle" w="med" len="med"/>
+          </a:ln>
+        </p:spPr>
+        <p:style>
+          <a:lnRef idx="1">
+            <a:schemeClr val="dk1"/>
+          </a:lnRef>
+          <a:fillRef idx="0">
+            <a:schemeClr val="dk1"/>
+          </a:fillRef>
+          <a:effectRef idx="0">
+            <a:schemeClr val="dk1"/>
+          </a:effectRef>
+          <a:fontRef idx="minor">
+            <a:schemeClr val="tx1"/>
+          </a:fontRef>
+        </p:style>
+      </p:cxnSp>
+      <p:pic>
+        <p:nvPicPr>
+          <p:cNvPr id="73" name="Picture 72"/>
+          <p:cNvPicPr>
+            <a:picLocks noChangeAspect="1"/>
+          </p:cNvPicPr>
+          <p:nvPr/>
+        </p:nvPicPr>
+        <p:blipFill>
+          <a:blip r:embed="rId8" cstate="print">
+            <a:extLst>
+              <a:ext uri="{28A0092B-C50C-407E-A947-70E740481C1C}">
+                <a14:useLocalDpi xmlns:a14="http://schemas.microsoft.com/office/drawing/2010/main" val="0"/>
+              </a:ext>
+            </a:extLst>
+          </a:blip>
+          <a:stretch>
+            <a:fillRect/>
+          </a:stretch>
+        </p:blipFill>
+        <p:spPr>
+          <a:xfrm rot="5400000">
+            <a:off x="6259751" y="2066072"/>
+            <a:ext cx="179590" cy="106121"/>
+          </a:xfrm>
+          <a:prstGeom prst="rect">
+            <a:avLst/>
+          </a:prstGeom>
+        </p:spPr>
+      </p:pic>
+      <p:pic>
+        <p:nvPicPr>
+          <p:cNvPr id="74" name="Picture 73"/>
+          <p:cNvPicPr>
+            <a:picLocks noChangeAspect="1"/>
+          </p:cNvPicPr>
+          <p:nvPr/>
+        </p:nvPicPr>
+        <p:blipFill>
+          <a:blip r:embed="rId9" cstate="print">
+            <a:extLst>
+              <a:ext uri="{28A0092B-C50C-407E-A947-70E740481C1C}">
+                <a14:useLocalDpi xmlns:a14="http://schemas.microsoft.com/office/drawing/2010/main" val="0"/>
+              </a:ext>
+            </a:extLst>
+          </a:blip>
+          <a:stretch>
+            <a:fillRect/>
+          </a:stretch>
+        </p:blipFill>
+        <p:spPr>
+          <a:xfrm>
+            <a:off x="4663447" y="2289998"/>
+            <a:ext cx="164259" cy="211190"/>
+          </a:xfrm>
+          <a:prstGeom prst="rect">
+            <a:avLst/>
+          </a:prstGeom>
+        </p:spPr>
+      </p:pic>
+      <p:sp>
+        <p:nvSpPr>
+          <p:cNvPr id="75" name="TextBox 74"/>
+          <p:cNvSpPr txBox="1"/>
+          <p:nvPr/>
+        </p:nvSpPr>
+        <p:spPr>
+          <a:xfrm>
+            <a:off x="5895339" y="2009871"/>
+            <a:ext cx="450764" cy="246221"/>
+          </a:xfrm>
+          <a:prstGeom prst="rect">
+            <a:avLst/>
+          </a:prstGeom>
+          <a:noFill/>
+        </p:spPr>
+        <p:txBody>
+          <a:bodyPr wrap="none" rtlCol="0">
+            <a:spAutoFit/>
+          </a:bodyPr>
+          <a:lstStyle/>
+          <a:p>
+            <a:pPr algn="ctr"/>
+            <a:r>
+              <a:rPr lang="en-US" sz="1000" b="1" dirty="0" smtClean="0"/>
+              <a:t>(key)</a:t>
+            </a:r>
+            <a:endParaRPr lang="en-US" sz="1000" b="1" dirty="0"/>
+          </a:p>
+        </p:txBody>
+      </p:sp>
+      <p:sp>
+        <p:nvSpPr>
+          <p:cNvPr id="77" name="TextBox 76"/>
+          <p:cNvSpPr txBox="1"/>
+          <p:nvPr/>
+        </p:nvSpPr>
+        <p:spPr>
+          <a:xfrm>
+            <a:off x="4776101" y="2269583"/>
+            <a:ext cx="1018227" cy="246221"/>
+          </a:xfrm>
+          <a:prstGeom prst="rect">
+            <a:avLst/>
+          </a:prstGeom>
+          <a:noFill/>
+        </p:spPr>
+        <p:txBody>
+          <a:bodyPr wrap="none" rtlCol="0">
+            <a:spAutoFit/>
+          </a:bodyPr>
+          <a:lstStyle/>
+          <a:p>
+            <a:pPr algn="ctr"/>
+            <a:r>
+              <a:rPr lang="en-US" sz="1000" b="1" dirty="0" smtClean="0"/>
+              <a:t>(encrypted key)</a:t>
+            </a:r>
+            <a:endParaRPr lang="en-US" sz="1000" b="1" dirty="0"/>
+          </a:p>
+        </p:txBody>
+      </p:sp>
+      <p:pic>
+        <p:nvPicPr>
+          <p:cNvPr id="78" name="Picture 77"/>
+          <p:cNvPicPr>
+            <a:picLocks noChangeAspect="1"/>
+          </p:cNvPicPr>
+          <p:nvPr/>
+        </p:nvPicPr>
+        <p:blipFill>
+          <a:blip r:embed="rId9" cstate="print">
+            <a:extLst>
+              <a:ext uri="{28A0092B-C50C-407E-A947-70E740481C1C}">
+                <a14:useLocalDpi xmlns:a14="http://schemas.microsoft.com/office/drawing/2010/main" val="0"/>
+              </a:ext>
+            </a:extLst>
+          </a:blip>
+          <a:stretch>
+            <a:fillRect/>
+          </a:stretch>
+        </p:blipFill>
+        <p:spPr>
+          <a:xfrm>
+            <a:off x="2355253" y="2501188"/>
+            <a:ext cx="164259" cy="211190"/>
+          </a:xfrm>
+          <a:prstGeom prst="rect">
+            <a:avLst/>
+          </a:prstGeom>
+        </p:spPr>
+      </p:pic>
+      <p:grpSp>
+        <p:nvGrpSpPr>
+          <p:cNvPr id="24" name="Group 23"/>
+          <p:cNvGrpSpPr/>
+          <p:nvPr/>
+        </p:nvGrpSpPr>
+        <p:grpSpPr>
+          <a:xfrm>
+            <a:off x="3262327" y="3204194"/>
+            <a:ext cx="1066318" cy="246221"/>
+            <a:chOff x="2963348" y="3186287"/>
+            <a:chExt cx="1066318" cy="246221"/>
+          </a:xfrm>
+        </p:grpSpPr>
+        <p:sp>
+          <p:nvSpPr>
+            <p:cNvPr id="37" name="TextBox 36"/>
+            <p:cNvSpPr txBox="1"/>
+            <p:nvPr/>
+          </p:nvSpPr>
+          <p:spPr>
+            <a:xfrm>
+              <a:off x="2963348" y="3186287"/>
+              <a:ext cx="1066318" cy="246221"/>
+            </a:xfrm>
+            <a:prstGeom prst="rect">
+              <a:avLst/>
+            </a:prstGeom>
+            <a:noFill/>
+          </p:spPr>
+          <p:txBody>
+            <a:bodyPr wrap="none" rtlCol="0">
+              <a:spAutoFit/>
+            </a:bodyPr>
+            <a:lstStyle/>
+            <a:p>
+              <a:pPr algn="ctr"/>
+              <a:r>
+                <a:rPr lang="en-US" sz="1000" b="1" dirty="0" smtClean="0"/>
+                <a:t>(</a:t>
+              </a:r>
+              <a:r>
+                <a:rPr lang="en-US" sz="1000" b="1" dirty="0" smtClean="0"/>
+                <a:t>user, time,        )</a:t>
+              </a:r>
+              <a:endParaRPr lang="en-US" sz="1000" b="1" dirty="0"/>
+            </a:p>
+          </p:txBody>
+        </p:sp>
+        <p:pic>
+          <p:nvPicPr>
+            <p:cNvPr id="80" name="Picture 79"/>
+            <p:cNvPicPr>
+              <a:picLocks noChangeAspect="1"/>
+            </p:cNvPicPr>
+            <p:nvPr/>
+          </p:nvPicPr>
+          <p:blipFill>
+            <a:blip r:embed="rId9" cstate="print">
+              <a:extLst>
+                <a:ext uri="{28A0092B-C50C-407E-A947-70E740481C1C}">
+                  <a14:useLocalDpi xmlns:a14="http://schemas.microsoft.com/office/drawing/2010/main" val="0"/>
+                </a:ext>
+              </a:extLst>
+            </a:blip>
+            <a:stretch>
+              <a:fillRect/>
+            </a:stretch>
+          </p:blipFill>
+          <p:spPr>
+            <a:xfrm>
+              <a:off x="3701249" y="3205588"/>
+              <a:ext cx="164259" cy="211190"/>
+            </a:xfrm>
+            <a:prstGeom prst="rect">
+              <a:avLst/>
+            </a:prstGeom>
+          </p:spPr>
+        </p:pic>
+      </p:grpSp>
+      <p:pic>
+        <p:nvPicPr>
+          <p:cNvPr id="81" name="Picture 80"/>
+          <p:cNvPicPr>
+            <a:picLocks noChangeAspect="1"/>
+          </p:cNvPicPr>
+          <p:nvPr/>
+        </p:nvPicPr>
+        <p:blipFill>
+          <a:blip r:embed="rId9" cstate="print">
+            <a:extLst>
+              <a:ext uri="{28A0092B-C50C-407E-A947-70E740481C1C}">
+                <a14:useLocalDpi xmlns:a14="http://schemas.microsoft.com/office/drawing/2010/main" val="0"/>
+              </a:ext>
+            </a:extLst>
+          </a:blip>
+          <a:stretch>
+            <a:fillRect/>
+          </a:stretch>
+        </p:blipFill>
+        <p:spPr>
+          <a:xfrm>
+            <a:off x="6186276" y="4512060"/>
+            <a:ext cx="164259" cy="211190"/>
+          </a:xfrm>
+          <a:prstGeom prst="rect">
+            <a:avLst/>
+          </a:prstGeom>
+        </p:spPr>
+      </p:pic>
+      <p:pic>
+        <p:nvPicPr>
+          <p:cNvPr id="92" name="Picture 91"/>
+          <p:cNvPicPr>
+            <a:picLocks noChangeAspect="1"/>
+          </p:cNvPicPr>
+          <p:nvPr/>
+        </p:nvPicPr>
+        <p:blipFill>
+          <a:blip r:embed="rId8" cstate="print">
+            <a:extLst>
+              <a:ext uri="{28A0092B-C50C-407E-A947-70E740481C1C}">
+                <a14:useLocalDpi xmlns:a14="http://schemas.microsoft.com/office/drawing/2010/main" val="0"/>
+              </a:ext>
+            </a:extLst>
+          </a:blip>
+          <a:stretch>
+            <a:fillRect/>
+          </a:stretch>
+        </p:blipFill>
+        <p:spPr>
+          <a:xfrm rot="5400000">
+            <a:off x="4633245" y="4892578"/>
+            <a:ext cx="179590" cy="106121"/>
+          </a:xfrm>
+          <a:prstGeom prst="rect">
+            <a:avLst/>
+          </a:prstGeom>
+        </p:spPr>
+      </p:pic>
+      <p:sp>
+        <p:nvSpPr>
+          <p:cNvPr id="93" name="TextBox 92"/>
+          <p:cNvSpPr txBox="1"/>
+          <p:nvPr/>
+        </p:nvSpPr>
+        <p:spPr>
+          <a:xfrm>
+            <a:off x="4172678" y="1012515"/>
+            <a:ext cx="572898" cy="139132"/>
+          </a:xfrm>
+          <a:prstGeom prst="rect">
+            <a:avLst/>
+          </a:prstGeom>
+          <a:noFill/>
+        </p:spPr>
+        <p:txBody>
+          <a:bodyPr wrap="square" lIns="0" tIns="0" rIns="0" bIns="0" rtlCol="0" anchor="t">
+            <a:noAutofit/>
+          </a:bodyPr>
+          <a:lstStyle/>
+          <a:p>
+            <a:pPr algn="ctr"/>
+            <a:r>
+              <a:rPr lang="en-US" sz="1000" b="1" spc="-50" dirty="0" smtClean="0"/>
+              <a:t>Lambda</a:t>
+            </a:r>
+            <a:endParaRPr lang="en-US" sz="1000" b="1" spc="-50" dirty="0"/>
+          </a:p>
+        </p:txBody>
+      </p:sp>
+      <p:cxnSp>
+        <p:nvCxnSpPr>
+          <p:cNvPr id="94" name="Straight Arrow Connector 93"/>
+          <p:cNvCxnSpPr/>
+          <p:nvPr/>
+        </p:nvCxnSpPr>
+        <p:spPr>
+          <a:xfrm>
+            <a:off x="4532386" y="2245347"/>
+            <a:ext cx="1870221" cy="0"/>
+          </a:xfrm>
+          <a:prstGeom prst="straightConnector1">
+            <a:avLst/>
+          </a:prstGeom>
+          <a:ln w="19050">
+            <a:headEnd type="triangle" w="med" len="med"/>
+            <a:tailEnd type="none" w="med" len="med"/>
+          </a:ln>
+        </p:spPr>
+        <p:style>
+          <a:lnRef idx="1">
+            <a:schemeClr val="dk1"/>
+          </a:lnRef>
+          <a:fillRef idx="0">
+            <a:schemeClr val="dk1"/>
+          </a:fillRef>
+          <a:effectRef idx="0">
+            <a:schemeClr val="dk1"/>
+          </a:effectRef>
+          <a:fontRef idx="minor">
+            <a:schemeClr val="tx1"/>
+          </a:fontRef>
+        </p:style>
+      </p:cxnSp>
+      <p:cxnSp>
+        <p:nvCxnSpPr>
+          <p:cNvPr id="97" name="Straight Arrow Connector 96"/>
+          <p:cNvCxnSpPr/>
+          <p:nvPr/>
+        </p:nvCxnSpPr>
+        <p:spPr>
+          <a:xfrm>
+            <a:off x="4546981" y="4789211"/>
+            <a:ext cx="1877632" cy="0"/>
+          </a:xfrm>
+          <a:prstGeom prst="straightConnector1">
+            <a:avLst/>
+          </a:prstGeom>
+          <a:ln w="19050">
+            <a:headEnd type="triangle" w="med" len="med"/>
+            <a:tailEnd type="none" w="med" len="med"/>
+          </a:ln>
+        </p:spPr>
+        <p:style>
+          <a:lnRef idx="1">
+            <a:schemeClr val="dk1"/>
+          </a:lnRef>
+          <a:fillRef idx="0">
+            <a:schemeClr val="dk1"/>
+          </a:fillRef>
+          <a:effectRef idx="0">
+            <a:schemeClr val="dk1"/>
+          </a:effectRef>
+          <a:fontRef idx="minor">
+            <a:schemeClr val="tx1"/>
+          </a:fontRef>
+        </p:style>
+      </p:cxnSp>
     </p:spTree>
     <p:extLst>
       <p:ext uri="{BB962C8B-B14F-4D97-AF65-F5344CB8AC3E}">
@@ -6216,6 +6939,1693 @@
   <p:clrMapOvr>
     <a:masterClrMapping/>
   </p:clrMapOvr>
+  <p:timing>
+    <p:tnLst>
+      <p:par>
+        <p:cTn id="1" dur="indefinite" restart="never" nodeType="tmRoot">
+          <p:childTnLst>
+            <p:seq concurrent="1" nextAc="seek">
+              <p:cTn id="2" dur="indefinite" nodeType="mainSeq">
+                <p:childTnLst>
+                  <p:par>
+                    <p:cTn id="3" fill="hold">
+                      <p:stCondLst>
+                        <p:cond delay="indefinite"/>
+                      </p:stCondLst>
+                      <p:childTnLst>
+                        <p:par>
+                          <p:cTn id="4" fill="hold">
+                            <p:stCondLst>
+                              <p:cond delay="0"/>
+                            </p:stCondLst>
+                            <p:childTnLst>
+                              <p:par>
+                                <p:cTn id="5" presetID="1" presetClass="entr" presetSubtype="0" fill="hold" grpId="0" nodeType="clickEffect">
+                                  <p:stCondLst>
+                                    <p:cond delay="0"/>
+                                  </p:stCondLst>
+                                  <p:childTnLst>
+                                    <p:set>
+                                      <p:cBhvr>
+                                        <p:cTn id="6" dur="1" fill="hold">
+                                          <p:stCondLst>
+                                            <p:cond delay="0"/>
+                                          </p:stCondLst>
+                                        </p:cTn>
+                                        <p:tgtEl>
+                                          <p:spTgt spid="8"/>
+                                        </p:tgtEl>
+                                        <p:attrNameLst>
+                                          <p:attrName>style.visibility</p:attrName>
+                                        </p:attrNameLst>
+                                      </p:cBhvr>
+                                      <p:to>
+                                        <p:strVal val="visible"/>
+                                      </p:to>
+                                    </p:set>
+                                  </p:childTnLst>
+                                </p:cTn>
+                              </p:par>
+                              <p:par>
+                                <p:cTn id="7" presetID="1" presetClass="entr" presetSubtype="0" fill="hold" nodeType="withEffect">
+                                  <p:stCondLst>
+                                    <p:cond delay="0"/>
+                                  </p:stCondLst>
+                                  <p:childTnLst>
+                                    <p:set>
+                                      <p:cBhvr>
+                                        <p:cTn id="8" dur="1" fill="hold">
+                                          <p:stCondLst>
+                                            <p:cond delay="0"/>
+                                          </p:stCondLst>
+                                        </p:cTn>
+                                        <p:tgtEl>
+                                          <p:spTgt spid="10"/>
+                                        </p:tgtEl>
+                                        <p:attrNameLst>
+                                          <p:attrName>style.visibility</p:attrName>
+                                        </p:attrNameLst>
+                                      </p:cBhvr>
+                                      <p:to>
+                                        <p:strVal val="visible"/>
+                                      </p:to>
+                                    </p:set>
+                                  </p:childTnLst>
+                                </p:cTn>
+                              </p:par>
+                              <p:par>
+                                <p:cTn id="9" presetID="1" presetClass="entr" presetSubtype="0" fill="hold" grpId="0" nodeType="withEffect">
+                                  <p:stCondLst>
+                                    <p:cond delay="0"/>
+                                  </p:stCondLst>
+                                  <p:childTnLst>
+                                    <p:set>
+                                      <p:cBhvr>
+                                        <p:cTn id="10" dur="1" fill="hold">
+                                          <p:stCondLst>
+                                            <p:cond delay="0"/>
+                                          </p:stCondLst>
+                                        </p:cTn>
+                                        <p:tgtEl>
+                                          <p:spTgt spid="7"/>
+                                        </p:tgtEl>
+                                        <p:attrNameLst>
+                                          <p:attrName>style.visibility</p:attrName>
+                                        </p:attrNameLst>
+                                      </p:cBhvr>
+                                      <p:to>
+                                        <p:strVal val="visible"/>
+                                      </p:to>
+                                    </p:set>
+                                  </p:childTnLst>
+                                </p:cTn>
+                              </p:par>
+                              <p:par>
+                                <p:cTn id="11" presetID="1" presetClass="entr" presetSubtype="0" fill="hold" grpId="0" nodeType="withEffect">
+                                  <p:stCondLst>
+                                    <p:cond delay="0"/>
+                                  </p:stCondLst>
+                                  <p:childTnLst>
+                                    <p:set>
+                                      <p:cBhvr>
+                                        <p:cTn id="12" dur="1" fill="hold">
+                                          <p:stCondLst>
+                                            <p:cond delay="0"/>
+                                          </p:stCondLst>
+                                        </p:cTn>
+                                        <p:tgtEl>
+                                          <p:spTgt spid="93"/>
+                                        </p:tgtEl>
+                                        <p:attrNameLst>
+                                          <p:attrName>style.visibility</p:attrName>
+                                        </p:attrNameLst>
+                                      </p:cBhvr>
+                                      <p:to>
+                                        <p:strVal val="visible"/>
+                                      </p:to>
+                                    </p:set>
+                                  </p:childTnLst>
+                                </p:cTn>
+                              </p:par>
+                              <p:par>
+                                <p:cTn id="13" presetID="1" presetClass="entr" presetSubtype="0" fill="hold" nodeType="withEffect">
+                                  <p:stCondLst>
+                                    <p:cond delay="0"/>
+                                  </p:stCondLst>
+                                  <p:childTnLst>
+                                    <p:set>
+                                      <p:cBhvr>
+                                        <p:cTn id="14" dur="1" fill="hold">
+                                          <p:stCondLst>
+                                            <p:cond delay="0"/>
+                                          </p:stCondLst>
+                                        </p:cTn>
+                                        <p:tgtEl>
+                                          <p:spTgt spid="2"/>
+                                        </p:tgtEl>
+                                        <p:attrNameLst>
+                                          <p:attrName>style.visibility</p:attrName>
+                                        </p:attrNameLst>
+                                      </p:cBhvr>
+                                      <p:to>
+                                        <p:strVal val="visible"/>
+                                      </p:to>
+                                    </p:set>
+                                  </p:childTnLst>
+                                </p:cTn>
+                              </p:par>
+                            </p:childTnLst>
+                          </p:cTn>
+                        </p:par>
+                      </p:childTnLst>
+                    </p:cTn>
+                  </p:par>
+                  <p:par>
+                    <p:cTn id="15" fill="hold">
+                      <p:stCondLst>
+                        <p:cond delay="indefinite"/>
+                      </p:stCondLst>
+                      <p:childTnLst>
+                        <p:par>
+                          <p:cTn id="16" fill="hold">
+                            <p:stCondLst>
+                              <p:cond delay="0"/>
+                            </p:stCondLst>
+                            <p:childTnLst>
+                              <p:par>
+                                <p:cTn id="17" presetID="1" presetClass="entr" presetSubtype="0" fill="hold" grpId="0" nodeType="clickEffect">
+                                  <p:stCondLst>
+                                    <p:cond delay="0"/>
+                                  </p:stCondLst>
+                                  <p:childTnLst>
+                                    <p:set>
+                                      <p:cBhvr>
+                                        <p:cTn id="18" dur="1" fill="hold">
+                                          <p:stCondLst>
+                                            <p:cond delay="0"/>
+                                          </p:stCondLst>
+                                        </p:cTn>
+                                        <p:tgtEl>
+                                          <p:spTgt spid="68"/>
+                                        </p:tgtEl>
+                                        <p:attrNameLst>
+                                          <p:attrName>style.visibility</p:attrName>
+                                        </p:attrNameLst>
+                                      </p:cBhvr>
+                                      <p:to>
+                                        <p:strVal val="visible"/>
+                                      </p:to>
+                                    </p:set>
+                                  </p:childTnLst>
+                                </p:cTn>
+                              </p:par>
+                              <p:par>
+                                <p:cTn id="19" presetID="1" presetClass="entr" presetSubtype="0" fill="hold" grpId="0" nodeType="withEffect">
+                                  <p:stCondLst>
+                                    <p:cond delay="0"/>
+                                  </p:stCondLst>
+                                  <p:childTnLst>
+                                    <p:set>
+                                      <p:cBhvr>
+                                        <p:cTn id="20" dur="1" fill="hold">
+                                          <p:stCondLst>
+                                            <p:cond delay="0"/>
+                                          </p:stCondLst>
+                                        </p:cTn>
+                                        <p:tgtEl>
+                                          <p:spTgt spid="9"/>
+                                        </p:tgtEl>
+                                        <p:attrNameLst>
+                                          <p:attrName>style.visibility</p:attrName>
+                                        </p:attrNameLst>
+                                      </p:cBhvr>
+                                      <p:to>
+                                        <p:strVal val="visible"/>
+                                      </p:to>
+                                    </p:set>
+                                  </p:childTnLst>
+                                </p:cTn>
+                              </p:par>
+                            </p:childTnLst>
+                          </p:cTn>
+                        </p:par>
+                      </p:childTnLst>
+                    </p:cTn>
+                  </p:par>
+                  <p:par>
+                    <p:cTn id="21" fill="hold">
+                      <p:stCondLst>
+                        <p:cond delay="indefinite"/>
+                      </p:stCondLst>
+                      <p:childTnLst>
+                        <p:par>
+                          <p:cTn id="22" fill="hold">
+                            <p:stCondLst>
+                              <p:cond delay="0"/>
+                            </p:stCondLst>
+                            <p:childTnLst>
+                              <p:par>
+                                <p:cTn id="23" presetID="1" presetClass="entr" presetSubtype="0" fill="hold" grpId="0" nodeType="clickEffect">
+                                  <p:stCondLst>
+                                    <p:cond delay="0"/>
+                                  </p:stCondLst>
+                                  <p:childTnLst>
+                                    <p:set>
+                                      <p:cBhvr>
+                                        <p:cTn id="24" dur="1" fill="hold">
+                                          <p:stCondLst>
+                                            <p:cond delay="0"/>
+                                          </p:stCondLst>
+                                        </p:cTn>
+                                        <p:tgtEl>
+                                          <p:spTgt spid="13"/>
+                                        </p:tgtEl>
+                                        <p:attrNameLst>
+                                          <p:attrName>style.visibility</p:attrName>
+                                        </p:attrNameLst>
+                                      </p:cBhvr>
+                                      <p:to>
+                                        <p:strVal val="visible"/>
+                                      </p:to>
+                                    </p:set>
+                                  </p:childTnLst>
+                                </p:cTn>
+                              </p:par>
+                            </p:childTnLst>
+                          </p:cTn>
+                        </p:par>
+                      </p:childTnLst>
+                    </p:cTn>
+                  </p:par>
+                  <p:par>
+                    <p:cTn id="25" fill="hold">
+                      <p:stCondLst>
+                        <p:cond delay="indefinite"/>
+                      </p:stCondLst>
+                      <p:childTnLst>
+                        <p:par>
+                          <p:cTn id="26" fill="hold">
+                            <p:stCondLst>
+                              <p:cond delay="0"/>
+                            </p:stCondLst>
+                            <p:childTnLst>
+                              <p:par>
+                                <p:cTn id="27" presetID="1" presetClass="entr" presetSubtype="0" fill="hold" nodeType="clickEffect">
+                                  <p:stCondLst>
+                                    <p:cond delay="0"/>
+                                  </p:stCondLst>
+                                  <p:childTnLst>
+                                    <p:set>
+                                      <p:cBhvr>
+                                        <p:cTn id="28" dur="1" fill="hold">
+                                          <p:stCondLst>
+                                            <p:cond delay="0"/>
+                                          </p:stCondLst>
+                                        </p:cTn>
+                                        <p:tgtEl>
+                                          <p:spTgt spid="61"/>
+                                        </p:tgtEl>
+                                        <p:attrNameLst>
+                                          <p:attrName>style.visibility</p:attrName>
+                                        </p:attrNameLst>
+                                      </p:cBhvr>
+                                      <p:to>
+                                        <p:strVal val="visible"/>
+                                      </p:to>
+                                    </p:set>
+                                  </p:childTnLst>
+                                </p:cTn>
+                              </p:par>
+                              <p:par>
+                                <p:cTn id="29" presetID="1" presetClass="entr" presetSubtype="0" fill="hold" grpId="0" nodeType="withEffect">
+                                  <p:stCondLst>
+                                    <p:cond delay="0"/>
+                                  </p:stCondLst>
+                                  <p:childTnLst>
+                                    <p:set>
+                                      <p:cBhvr>
+                                        <p:cTn id="30" dur="1" fill="hold">
+                                          <p:stCondLst>
+                                            <p:cond delay="0"/>
+                                          </p:stCondLst>
+                                        </p:cTn>
+                                        <p:tgtEl>
+                                          <p:spTgt spid="75"/>
+                                        </p:tgtEl>
+                                        <p:attrNameLst>
+                                          <p:attrName>style.visibility</p:attrName>
+                                        </p:attrNameLst>
+                                      </p:cBhvr>
+                                      <p:to>
+                                        <p:strVal val="visible"/>
+                                      </p:to>
+                                    </p:set>
+                                  </p:childTnLst>
+                                </p:cTn>
+                              </p:par>
+                              <p:par>
+                                <p:cTn id="31" presetID="1" presetClass="entr" presetSubtype="0" fill="hold" nodeType="withEffect">
+                                  <p:stCondLst>
+                                    <p:cond delay="0"/>
+                                  </p:stCondLst>
+                                  <p:childTnLst>
+                                    <p:set>
+                                      <p:cBhvr>
+                                        <p:cTn id="32" dur="1" fill="hold">
+                                          <p:stCondLst>
+                                            <p:cond delay="0"/>
+                                          </p:stCondLst>
+                                        </p:cTn>
+                                        <p:tgtEl>
+                                          <p:spTgt spid="73"/>
+                                        </p:tgtEl>
+                                        <p:attrNameLst>
+                                          <p:attrName>style.visibility</p:attrName>
+                                        </p:attrNameLst>
+                                      </p:cBhvr>
+                                      <p:to>
+                                        <p:strVal val="visible"/>
+                                      </p:to>
+                                    </p:set>
+                                  </p:childTnLst>
+                                </p:cTn>
+                              </p:par>
+                              <p:par>
+                                <p:cTn id="33" presetID="1" presetClass="entr" presetSubtype="0" fill="hold" nodeType="withEffect">
+                                  <p:stCondLst>
+                                    <p:cond delay="0"/>
+                                  </p:stCondLst>
+                                  <p:childTnLst>
+                                    <p:set>
+                                      <p:cBhvr>
+                                        <p:cTn id="34" dur="1" fill="hold">
+                                          <p:stCondLst>
+                                            <p:cond delay="0"/>
+                                          </p:stCondLst>
+                                        </p:cTn>
+                                        <p:tgtEl>
+                                          <p:spTgt spid="53"/>
+                                        </p:tgtEl>
+                                        <p:attrNameLst>
+                                          <p:attrName>style.visibility</p:attrName>
+                                        </p:attrNameLst>
+                                      </p:cBhvr>
+                                      <p:to>
+                                        <p:strVal val="visible"/>
+                                      </p:to>
+                                    </p:set>
+                                  </p:childTnLst>
+                                </p:cTn>
+                              </p:par>
+                              <p:par>
+                                <p:cTn id="35" presetID="1" presetClass="entr" presetSubtype="0" fill="hold" nodeType="withEffect">
+                                  <p:stCondLst>
+                                    <p:cond delay="0"/>
+                                  </p:stCondLst>
+                                  <p:childTnLst>
+                                    <p:set>
+                                      <p:cBhvr>
+                                        <p:cTn id="36" dur="1" fill="hold">
+                                          <p:stCondLst>
+                                            <p:cond delay="0"/>
+                                          </p:stCondLst>
+                                        </p:cTn>
+                                        <p:tgtEl>
+                                          <p:spTgt spid="50"/>
+                                        </p:tgtEl>
+                                        <p:attrNameLst>
+                                          <p:attrName>style.visibility</p:attrName>
+                                        </p:attrNameLst>
+                                      </p:cBhvr>
+                                      <p:to>
+                                        <p:strVal val="visible"/>
+                                      </p:to>
+                                    </p:set>
+                                  </p:childTnLst>
+                                </p:cTn>
+                              </p:par>
+                              <p:par>
+                                <p:cTn id="37" presetID="1" presetClass="entr" presetSubtype="0" fill="hold" grpId="0" nodeType="withEffect">
+                                  <p:stCondLst>
+                                    <p:cond delay="0"/>
+                                  </p:stCondLst>
+                                  <p:childTnLst>
+                                    <p:set>
+                                      <p:cBhvr>
+                                        <p:cTn id="38" dur="1" fill="hold">
+                                          <p:stCondLst>
+                                            <p:cond delay="0"/>
+                                          </p:stCondLst>
+                                        </p:cTn>
+                                        <p:tgtEl>
+                                          <p:spTgt spid="55"/>
+                                        </p:tgtEl>
+                                        <p:attrNameLst>
+                                          <p:attrName>style.visibility</p:attrName>
+                                        </p:attrNameLst>
+                                      </p:cBhvr>
+                                      <p:to>
+                                        <p:strVal val="visible"/>
+                                      </p:to>
+                                    </p:set>
+                                  </p:childTnLst>
+                                </p:cTn>
+                              </p:par>
+                            </p:childTnLst>
+                          </p:cTn>
+                        </p:par>
+                      </p:childTnLst>
+                    </p:cTn>
+                  </p:par>
+                  <p:par>
+                    <p:cTn id="39" fill="hold">
+                      <p:stCondLst>
+                        <p:cond delay="indefinite"/>
+                      </p:stCondLst>
+                      <p:childTnLst>
+                        <p:par>
+                          <p:cTn id="40" fill="hold">
+                            <p:stCondLst>
+                              <p:cond delay="0"/>
+                            </p:stCondLst>
+                            <p:childTnLst>
+                              <p:par>
+                                <p:cTn id="41" presetID="1" presetClass="entr" presetSubtype="0" fill="hold" nodeType="clickEffect">
+                                  <p:stCondLst>
+                                    <p:cond delay="0"/>
+                                  </p:stCondLst>
+                                  <p:childTnLst>
+                                    <p:set>
+                                      <p:cBhvr>
+                                        <p:cTn id="42" dur="1" fill="hold">
+                                          <p:stCondLst>
+                                            <p:cond delay="0"/>
+                                          </p:stCondLst>
+                                        </p:cTn>
+                                        <p:tgtEl>
+                                          <p:spTgt spid="94"/>
+                                        </p:tgtEl>
+                                        <p:attrNameLst>
+                                          <p:attrName>style.visibility</p:attrName>
+                                        </p:attrNameLst>
+                                      </p:cBhvr>
+                                      <p:to>
+                                        <p:strVal val="visible"/>
+                                      </p:to>
+                                    </p:set>
+                                  </p:childTnLst>
+                                </p:cTn>
+                              </p:par>
+                              <p:par>
+                                <p:cTn id="43" presetID="1" presetClass="entr" presetSubtype="0" fill="hold" grpId="0" nodeType="withEffect">
+                                  <p:stCondLst>
+                                    <p:cond delay="0"/>
+                                  </p:stCondLst>
+                                  <p:childTnLst>
+                                    <p:set>
+                                      <p:cBhvr>
+                                        <p:cTn id="44" dur="1" fill="hold">
+                                          <p:stCondLst>
+                                            <p:cond delay="0"/>
+                                          </p:stCondLst>
+                                        </p:cTn>
+                                        <p:tgtEl>
+                                          <p:spTgt spid="77"/>
+                                        </p:tgtEl>
+                                        <p:attrNameLst>
+                                          <p:attrName>style.visibility</p:attrName>
+                                        </p:attrNameLst>
+                                      </p:cBhvr>
+                                      <p:to>
+                                        <p:strVal val="visible"/>
+                                      </p:to>
+                                    </p:set>
+                                  </p:childTnLst>
+                                </p:cTn>
+                              </p:par>
+                              <p:par>
+                                <p:cTn id="45" presetID="1" presetClass="entr" presetSubtype="0" fill="hold" nodeType="withEffect">
+                                  <p:stCondLst>
+                                    <p:cond delay="0"/>
+                                  </p:stCondLst>
+                                  <p:childTnLst>
+                                    <p:set>
+                                      <p:cBhvr>
+                                        <p:cTn id="46" dur="1" fill="hold">
+                                          <p:stCondLst>
+                                            <p:cond delay="0"/>
+                                          </p:stCondLst>
+                                        </p:cTn>
+                                        <p:tgtEl>
+                                          <p:spTgt spid="74"/>
+                                        </p:tgtEl>
+                                        <p:attrNameLst>
+                                          <p:attrName>style.visibility</p:attrName>
+                                        </p:attrNameLst>
+                                      </p:cBhvr>
+                                      <p:to>
+                                        <p:strVal val="visible"/>
+                                      </p:to>
+                                    </p:set>
+                                  </p:childTnLst>
+                                </p:cTn>
+                              </p:par>
+                            </p:childTnLst>
+                          </p:cTn>
+                        </p:par>
+                      </p:childTnLst>
+                    </p:cTn>
+                  </p:par>
+                  <p:par>
+                    <p:cTn id="47" fill="hold">
+                      <p:stCondLst>
+                        <p:cond delay="indefinite"/>
+                      </p:stCondLst>
+                      <p:childTnLst>
+                        <p:par>
+                          <p:cTn id="48" fill="hold">
+                            <p:stCondLst>
+                              <p:cond delay="0"/>
+                            </p:stCondLst>
+                            <p:childTnLst>
+                              <p:par>
+                                <p:cTn id="49" presetID="1" presetClass="entr" presetSubtype="0" fill="hold" nodeType="clickEffect">
+                                  <p:stCondLst>
+                                    <p:cond delay="0"/>
+                                  </p:stCondLst>
+                                  <p:childTnLst>
+                                    <p:set>
+                                      <p:cBhvr>
+                                        <p:cTn id="50" dur="1" fill="hold">
+                                          <p:stCondLst>
+                                            <p:cond delay="0"/>
+                                          </p:stCondLst>
+                                        </p:cTn>
+                                        <p:tgtEl>
+                                          <p:spTgt spid="12"/>
+                                        </p:tgtEl>
+                                        <p:attrNameLst>
+                                          <p:attrName>style.visibility</p:attrName>
+                                        </p:attrNameLst>
+                                      </p:cBhvr>
+                                      <p:to>
+                                        <p:strVal val="visible"/>
+                                      </p:to>
+                                    </p:set>
+                                  </p:childTnLst>
+                                </p:cTn>
+                              </p:par>
+                              <p:par>
+                                <p:cTn id="51" presetID="1" presetClass="entr" presetSubtype="0" fill="hold" grpId="0" nodeType="withEffect">
+                                  <p:stCondLst>
+                                    <p:cond delay="0"/>
+                                  </p:stCondLst>
+                                  <p:childTnLst>
+                                    <p:set>
+                                      <p:cBhvr>
+                                        <p:cTn id="52" dur="1" fill="hold">
+                                          <p:stCondLst>
+                                            <p:cond delay="0"/>
+                                          </p:stCondLst>
+                                        </p:cTn>
+                                        <p:tgtEl>
+                                          <p:spTgt spid="14"/>
+                                        </p:tgtEl>
+                                        <p:attrNameLst>
+                                          <p:attrName>style.visibility</p:attrName>
+                                        </p:attrNameLst>
+                                      </p:cBhvr>
+                                      <p:to>
+                                        <p:strVal val="visible"/>
+                                      </p:to>
+                                    </p:set>
+                                  </p:childTnLst>
+                                </p:cTn>
+                              </p:par>
+                              <p:par>
+                                <p:cTn id="53" presetID="1" presetClass="entr" presetSubtype="0" fill="hold" nodeType="withEffect">
+                                  <p:stCondLst>
+                                    <p:cond delay="0"/>
+                                  </p:stCondLst>
+                                  <p:childTnLst>
+                                    <p:set>
+                                      <p:cBhvr>
+                                        <p:cTn id="54" dur="1" fill="hold">
+                                          <p:stCondLst>
+                                            <p:cond delay="0"/>
+                                          </p:stCondLst>
+                                        </p:cTn>
+                                        <p:tgtEl>
+                                          <p:spTgt spid="79"/>
+                                        </p:tgtEl>
+                                        <p:attrNameLst>
+                                          <p:attrName>style.visibility</p:attrName>
+                                        </p:attrNameLst>
+                                      </p:cBhvr>
+                                      <p:to>
+                                        <p:strVal val="visible"/>
+                                      </p:to>
+                                    </p:set>
+                                  </p:childTnLst>
+                                </p:cTn>
+                              </p:par>
+                              <p:par>
+                                <p:cTn id="55" presetID="1" presetClass="entr" presetSubtype="0" fill="hold" nodeType="withEffect">
+                                  <p:stCondLst>
+                                    <p:cond delay="0"/>
+                                  </p:stCondLst>
+                                  <p:childTnLst>
+                                    <p:set>
+                                      <p:cBhvr>
+                                        <p:cTn id="56" dur="1" fill="hold">
+                                          <p:stCondLst>
+                                            <p:cond delay="0"/>
+                                          </p:stCondLst>
+                                        </p:cTn>
+                                        <p:tgtEl>
+                                          <p:spTgt spid="3"/>
+                                        </p:tgtEl>
+                                        <p:attrNameLst>
+                                          <p:attrName>style.visibility</p:attrName>
+                                        </p:attrNameLst>
+                                      </p:cBhvr>
+                                      <p:to>
+                                        <p:strVal val="visible"/>
+                                      </p:to>
+                                    </p:set>
+                                  </p:childTnLst>
+                                </p:cTn>
+                              </p:par>
+                              <p:par>
+                                <p:cTn id="57" presetID="1" presetClass="entr" presetSubtype="0" fill="hold" grpId="0" nodeType="withEffect">
+                                  <p:stCondLst>
+                                    <p:cond delay="0"/>
+                                  </p:stCondLst>
+                                  <p:childTnLst>
+                                    <p:set>
+                                      <p:cBhvr>
+                                        <p:cTn id="58" dur="1" fill="hold">
+                                          <p:stCondLst>
+                                            <p:cond delay="0"/>
+                                          </p:stCondLst>
+                                        </p:cTn>
+                                        <p:tgtEl>
+                                          <p:spTgt spid="117"/>
+                                        </p:tgtEl>
+                                        <p:attrNameLst>
+                                          <p:attrName>style.visibility</p:attrName>
+                                        </p:attrNameLst>
+                                      </p:cBhvr>
+                                      <p:to>
+                                        <p:strVal val="visible"/>
+                                      </p:to>
+                                    </p:set>
+                                  </p:childTnLst>
+                                </p:cTn>
+                              </p:par>
+                            </p:childTnLst>
+                          </p:cTn>
+                        </p:par>
+                      </p:childTnLst>
+                    </p:cTn>
+                  </p:par>
+                  <p:par>
+                    <p:cTn id="59" fill="hold">
+                      <p:stCondLst>
+                        <p:cond delay="indefinite"/>
+                      </p:stCondLst>
+                      <p:childTnLst>
+                        <p:par>
+                          <p:cTn id="60" fill="hold">
+                            <p:stCondLst>
+                              <p:cond delay="0"/>
+                            </p:stCondLst>
+                            <p:childTnLst>
+                              <p:par>
+                                <p:cTn id="61" presetID="1" presetClass="entr" presetSubtype="0" fill="hold" nodeType="clickEffect">
+                                  <p:stCondLst>
+                                    <p:cond delay="0"/>
+                                  </p:stCondLst>
+                                  <p:childTnLst>
+                                    <p:set>
+                                      <p:cBhvr>
+                                        <p:cTn id="62" dur="1" fill="hold">
+                                          <p:stCondLst>
+                                            <p:cond delay="0"/>
+                                          </p:stCondLst>
+                                        </p:cTn>
+                                        <p:tgtEl>
+                                          <p:spTgt spid="78"/>
+                                        </p:tgtEl>
+                                        <p:attrNameLst>
+                                          <p:attrName>style.visibility</p:attrName>
+                                        </p:attrNameLst>
+                                      </p:cBhvr>
+                                      <p:to>
+                                        <p:strVal val="visible"/>
+                                      </p:to>
+                                    </p:set>
+                                  </p:childTnLst>
+                                </p:cTn>
+                              </p:par>
+                              <p:par>
+                                <p:cTn id="63" presetID="1" presetClass="entr" presetSubtype="0" fill="hold" nodeType="withEffect">
+                                  <p:stCondLst>
+                                    <p:cond delay="0"/>
+                                  </p:stCondLst>
+                                  <p:childTnLst>
+                                    <p:set>
+                                      <p:cBhvr>
+                                        <p:cTn id="64" dur="1" fill="hold">
+                                          <p:stCondLst>
+                                            <p:cond delay="0"/>
+                                          </p:stCondLst>
+                                        </p:cTn>
+                                        <p:tgtEl>
+                                          <p:spTgt spid="15"/>
+                                        </p:tgtEl>
+                                        <p:attrNameLst>
+                                          <p:attrName>style.visibility</p:attrName>
+                                        </p:attrNameLst>
+                                      </p:cBhvr>
+                                      <p:to>
+                                        <p:strVal val="visible"/>
+                                      </p:to>
+                                    </p:set>
+                                  </p:childTnLst>
+                                </p:cTn>
+                              </p:par>
+                              <p:par>
+                                <p:cTn id="65" presetID="1" presetClass="entr" presetSubtype="0" fill="hold" grpId="0" nodeType="withEffect">
+                                  <p:stCondLst>
+                                    <p:cond delay="0"/>
+                                  </p:stCondLst>
+                                  <p:childTnLst>
+                                    <p:set>
+                                      <p:cBhvr>
+                                        <p:cTn id="66" dur="1" fill="hold">
+                                          <p:stCondLst>
+                                            <p:cond delay="0"/>
+                                          </p:stCondLst>
+                                        </p:cTn>
+                                        <p:tgtEl>
+                                          <p:spTgt spid="76"/>
+                                        </p:tgtEl>
+                                        <p:attrNameLst>
+                                          <p:attrName>style.visibility</p:attrName>
+                                        </p:attrNameLst>
+                                      </p:cBhvr>
+                                      <p:to>
+                                        <p:strVal val="visible"/>
+                                      </p:to>
+                                    </p:set>
+                                  </p:childTnLst>
+                                </p:cTn>
+                              </p:par>
+                            </p:childTnLst>
+                          </p:cTn>
+                        </p:par>
+                      </p:childTnLst>
+                    </p:cTn>
+                  </p:par>
+                  <p:par>
+                    <p:cTn id="67" fill="hold">
+                      <p:stCondLst>
+                        <p:cond delay="indefinite"/>
+                      </p:stCondLst>
+                      <p:childTnLst>
+                        <p:par>
+                          <p:cTn id="68" fill="hold">
+                            <p:stCondLst>
+                              <p:cond delay="0"/>
+                            </p:stCondLst>
+                            <p:childTnLst>
+                              <p:par>
+                                <p:cTn id="69" presetID="1" presetClass="entr" presetSubtype="0" fill="hold" grpId="0" nodeType="clickEffect">
+                                  <p:stCondLst>
+                                    <p:cond delay="0"/>
+                                  </p:stCondLst>
+                                  <p:childTnLst>
+                                    <p:set>
+                                      <p:cBhvr>
+                                        <p:cTn id="70" dur="1" fill="hold">
+                                          <p:stCondLst>
+                                            <p:cond delay="0"/>
+                                          </p:stCondLst>
+                                        </p:cTn>
+                                        <p:tgtEl>
+                                          <p:spTgt spid="39"/>
+                                        </p:tgtEl>
+                                        <p:attrNameLst>
+                                          <p:attrName>style.visibility</p:attrName>
+                                        </p:attrNameLst>
+                                      </p:cBhvr>
+                                      <p:to>
+                                        <p:strVal val="visible"/>
+                                      </p:to>
+                                    </p:set>
+                                  </p:childTnLst>
+                                </p:cTn>
+                              </p:par>
+                              <p:par>
+                                <p:cTn id="71" presetID="1" presetClass="entr" presetSubtype="0" fill="hold" grpId="0" nodeType="withEffect">
+                                  <p:stCondLst>
+                                    <p:cond delay="0"/>
+                                  </p:stCondLst>
+                                  <p:childTnLst>
+                                    <p:set>
+                                      <p:cBhvr>
+                                        <p:cTn id="72" dur="1" fill="hold">
+                                          <p:stCondLst>
+                                            <p:cond delay="0"/>
+                                          </p:stCondLst>
+                                        </p:cTn>
+                                        <p:tgtEl>
+                                          <p:spTgt spid="84"/>
+                                        </p:tgtEl>
+                                        <p:attrNameLst>
+                                          <p:attrName>style.visibility</p:attrName>
+                                        </p:attrNameLst>
+                                      </p:cBhvr>
+                                      <p:to>
+                                        <p:strVal val="visible"/>
+                                      </p:to>
+                                    </p:set>
+                                  </p:childTnLst>
+                                </p:cTn>
+                              </p:par>
+                              <p:par>
+                                <p:cTn id="73" presetID="1" presetClass="entr" presetSubtype="0" fill="hold" nodeType="withEffect">
+                                  <p:stCondLst>
+                                    <p:cond delay="0"/>
+                                  </p:stCondLst>
+                                  <p:childTnLst>
+                                    <p:set>
+                                      <p:cBhvr>
+                                        <p:cTn id="74" dur="1" fill="hold">
+                                          <p:stCondLst>
+                                            <p:cond delay="0"/>
+                                          </p:stCondLst>
+                                        </p:cTn>
+                                        <p:tgtEl>
+                                          <p:spTgt spid="38"/>
+                                        </p:tgtEl>
+                                        <p:attrNameLst>
+                                          <p:attrName>style.visibility</p:attrName>
+                                        </p:attrNameLst>
+                                      </p:cBhvr>
+                                      <p:to>
+                                        <p:strVal val="visible"/>
+                                      </p:to>
+                                    </p:set>
+                                  </p:childTnLst>
+                                </p:cTn>
+                              </p:par>
+                              <p:par>
+                                <p:cTn id="75" presetID="1" presetClass="entr" presetSubtype="0" fill="hold" nodeType="withEffect">
+                                  <p:stCondLst>
+                                    <p:cond delay="0"/>
+                                  </p:stCondLst>
+                                  <p:childTnLst>
+                                    <p:set>
+                                      <p:cBhvr>
+                                        <p:cTn id="76" dur="1" fill="hold">
+                                          <p:stCondLst>
+                                            <p:cond delay="0"/>
+                                          </p:stCondLst>
+                                        </p:cTn>
+                                        <p:tgtEl>
+                                          <p:spTgt spid="24"/>
+                                        </p:tgtEl>
+                                        <p:attrNameLst>
+                                          <p:attrName>style.visibility</p:attrName>
+                                        </p:attrNameLst>
+                                      </p:cBhvr>
+                                      <p:to>
+                                        <p:strVal val="visible"/>
+                                      </p:to>
+                                    </p:set>
+                                  </p:childTnLst>
+                                </p:cTn>
+                              </p:par>
+                              <p:par>
+                                <p:cTn id="77" presetID="1" presetClass="entr" presetSubtype="0" fill="hold" grpId="0" nodeType="withEffect">
+                                  <p:stCondLst>
+                                    <p:cond delay="0"/>
+                                  </p:stCondLst>
+                                  <p:childTnLst>
+                                    <p:set>
+                                      <p:cBhvr>
+                                        <p:cTn id="78" dur="1" fill="hold">
+                                          <p:stCondLst>
+                                            <p:cond delay="0"/>
+                                          </p:stCondLst>
+                                        </p:cTn>
+                                        <p:tgtEl>
+                                          <p:spTgt spid="82"/>
+                                        </p:tgtEl>
+                                        <p:attrNameLst>
+                                          <p:attrName>style.visibility</p:attrName>
+                                        </p:attrNameLst>
+                                      </p:cBhvr>
+                                      <p:to>
+                                        <p:strVal val="visible"/>
+                                      </p:to>
+                                    </p:set>
+                                  </p:childTnLst>
+                                </p:cTn>
+                              </p:par>
+                              <p:par>
+                                <p:cTn id="79" presetID="1" presetClass="entr" presetSubtype="0" fill="hold" grpId="0" nodeType="withEffect">
+                                  <p:stCondLst>
+                                    <p:cond delay="0"/>
+                                  </p:stCondLst>
+                                  <p:childTnLst>
+                                    <p:set>
+                                      <p:cBhvr>
+                                        <p:cTn id="80" dur="1" fill="hold">
+                                          <p:stCondLst>
+                                            <p:cond delay="0"/>
+                                          </p:stCondLst>
+                                        </p:cTn>
+                                        <p:tgtEl>
+                                          <p:spTgt spid="125"/>
+                                        </p:tgtEl>
+                                        <p:attrNameLst>
+                                          <p:attrName>style.visibility</p:attrName>
+                                        </p:attrNameLst>
+                                      </p:cBhvr>
+                                      <p:to>
+                                        <p:strVal val="visible"/>
+                                      </p:to>
+                                    </p:set>
+                                  </p:childTnLst>
+                                </p:cTn>
+                              </p:par>
+                            </p:childTnLst>
+                          </p:cTn>
+                        </p:par>
+                      </p:childTnLst>
+                    </p:cTn>
+                  </p:par>
+                  <p:par>
+                    <p:cTn id="81" fill="hold">
+                      <p:stCondLst>
+                        <p:cond delay="indefinite"/>
+                      </p:stCondLst>
+                      <p:childTnLst>
+                        <p:par>
+                          <p:cTn id="82" fill="hold">
+                            <p:stCondLst>
+                              <p:cond delay="0"/>
+                            </p:stCondLst>
+                            <p:childTnLst>
+                              <p:par>
+                                <p:cTn id="83" presetID="1" presetClass="entr" presetSubtype="0" fill="hold" nodeType="clickEffect">
+                                  <p:stCondLst>
+                                    <p:cond delay="0"/>
+                                  </p:stCondLst>
+                                  <p:childTnLst>
+                                    <p:set>
+                                      <p:cBhvr>
+                                        <p:cTn id="84" dur="1" fill="hold">
+                                          <p:stCondLst>
+                                            <p:cond delay="0"/>
+                                          </p:stCondLst>
+                                        </p:cTn>
+                                        <p:tgtEl>
+                                          <p:spTgt spid="122"/>
+                                        </p:tgtEl>
+                                        <p:attrNameLst>
+                                          <p:attrName>style.visibility</p:attrName>
+                                        </p:attrNameLst>
+                                      </p:cBhvr>
+                                      <p:to>
+                                        <p:strVal val="visible"/>
+                                      </p:to>
+                                    </p:set>
+                                  </p:childTnLst>
+                                </p:cTn>
+                              </p:par>
+                              <p:par>
+                                <p:cTn id="85" presetID="1" presetClass="entr" presetSubtype="0" fill="hold" grpId="0" nodeType="withEffect">
+                                  <p:stCondLst>
+                                    <p:cond delay="0"/>
+                                  </p:stCondLst>
+                                  <p:childTnLst>
+                                    <p:set>
+                                      <p:cBhvr>
+                                        <p:cTn id="86" dur="1" fill="hold">
+                                          <p:stCondLst>
+                                            <p:cond delay="0"/>
+                                          </p:stCondLst>
+                                        </p:cTn>
+                                        <p:tgtEl>
+                                          <p:spTgt spid="126"/>
+                                        </p:tgtEl>
+                                        <p:attrNameLst>
+                                          <p:attrName>style.visibility</p:attrName>
+                                        </p:attrNameLst>
+                                      </p:cBhvr>
+                                      <p:to>
+                                        <p:strVal val="visible"/>
+                                      </p:to>
+                                    </p:set>
+                                  </p:childTnLst>
+                                </p:cTn>
+                              </p:par>
+                            </p:childTnLst>
+                          </p:cTn>
+                        </p:par>
+                      </p:childTnLst>
+                    </p:cTn>
+                  </p:par>
+                  <p:par>
+                    <p:cTn id="87" fill="hold">
+                      <p:stCondLst>
+                        <p:cond delay="indefinite"/>
+                      </p:stCondLst>
+                      <p:childTnLst>
+                        <p:par>
+                          <p:cTn id="88" fill="hold">
+                            <p:stCondLst>
+                              <p:cond delay="0"/>
+                            </p:stCondLst>
+                            <p:childTnLst>
+                              <p:par>
+                                <p:cTn id="89" presetID="1" presetClass="entr" presetSubtype="0" fill="hold" nodeType="clickEffect">
+                                  <p:stCondLst>
+                                    <p:cond delay="0"/>
+                                  </p:stCondLst>
+                                  <p:childTnLst>
+                                    <p:set>
+                                      <p:cBhvr>
+                                        <p:cTn id="90" dur="1" fill="hold">
+                                          <p:stCondLst>
+                                            <p:cond delay="0"/>
+                                          </p:stCondLst>
+                                        </p:cTn>
+                                        <p:tgtEl>
+                                          <p:spTgt spid="67"/>
+                                        </p:tgtEl>
+                                        <p:attrNameLst>
+                                          <p:attrName>style.visibility</p:attrName>
+                                        </p:attrNameLst>
+                                      </p:cBhvr>
+                                      <p:to>
+                                        <p:strVal val="visible"/>
+                                      </p:to>
+                                    </p:set>
+                                  </p:childTnLst>
+                                </p:cTn>
+                              </p:par>
+                              <p:par>
+                                <p:cTn id="91" presetID="1" presetClass="entr" presetSubtype="0" fill="hold" grpId="0" nodeType="withEffect">
+                                  <p:stCondLst>
+                                    <p:cond delay="0"/>
+                                  </p:stCondLst>
+                                  <p:childTnLst>
+                                    <p:set>
+                                      <p:cBhvr>
+                                        <p:cTn id="92" dur="1" fill="hold">
+                                          <p:stCondLst>
+                                            <p:cond delay="0"/>
+                                          </p:stCondLst>
+                                        </p:cTn>
+                                        <p:tgtEl>
+                                          <p:spTgt spid="121"/>
+                                        </p:tgtEl>
+                                        <p:attrNameLst>
+                                          <p:attrName>style.visibility</p:attrName>
+                                        </p:attrNameLst>
+                                      </p:cBhvr>
+                                      <p:to>
+                                        <p:strVal val="visible"/>
+                                      </p:to>
+                                    </p:set>
+                                  </p:childTnLst>
+                                </p:cTn>
+                              </p:par>
+                              <p:par>
+                                <p:cTn id="93" presetID="1" presetClass="entr" presetSubtype="0" fill="hold" nodeType="withEffect">
+                                  <p:stCondLst>
+                                    <p:cond delay="0"/>
+                                  </p:stCondLst>
+                                  <p:childTnLst>
+                                    <p:set>
+                                      <p:cBhvr>
+                                        <p:cTn id="94" dur="1" fill="hold">
+                                          <p:stCondLst>
+                                            <p:cond delay="0"/>
+                                          </p:stCondLst>
+                                        </p:cTn>
+                                        <p:tgtEl>
+                                          <p:spTgt spid="81"/>
+                                        </p:tgtEl>
+                                        <p:attrNameLst>
+                                          <p:attrName>style.visibility</p:attrName>
+                                        </p:attrNameLst>
+                                      </p:cBhvr>
+                                      <p:to>
+                                        <p:strVal val="visible"/>
+                                      </p:to>
+                                    </p:set>
+                                  </p:childTnLst>
+                                </p:cTn>
+                              </p:par>
+                              <p:par>
+                                <p:cTn id="95" presetID="1" presetClass="entr" presetSubtype="0" fill="hold" grpId="0" nodeType="withEffect">
+                                  <p:stCondLst>
+                                    <p:cond delay="0"/>
+                                  </p:stCondLst>
+                                  <p:childTnLst>
+                                    <p:set>
+                                      <p:cBhvr>
+                                        <p:cTn id="96" dur="1" fill="hold">
+                                          <p:stCondLst>
+                                            <p:cond delay="0"/>
+                                          </p:stCondLst>
+                                        </p:cTn>
+                                        <p:tgtEl>
+                                          <p:spTgt spid="66"/>
+                                        </p:tgtEl>
+                                        <p:attrNameLst>
+                                          <p:attrName>style.visibility</p:attrName>
+                                        </p:attrNameLst>
+                                      </p:cBhvr>
+                                      <p:to>
+                                        <p:strVal val="visible"/>
+                                      </p:to>
+                                    </p:set>
+                                  </p:childTnLst>
+                                </p:cTn>
+                              </p:par>
+                            </p:childTnLst>
+                          </p:cTn>
+                        </p:par>
+                      </p:childTnLst>
+                    </p:cTn>
+                  </p:par>
+                  <p:par>
+                    <p:cTn id="97" fill="hold">
+                      <p:stCondLst>
+                        <p:cond delay="indefinite"/>
+                      </p:stCondLst>
+                      <p:childTnLst>
+                        <p:par>
+                          <p:cTn id="98" fill="hold">
+                            <p:stCondLst>
+                              <p:cond delay="0"/>
+                            </p:stCondLst>
+                            <p:childTnLst>
+                              <p:par>
+                                <p:cTn id="99" presetID="1" presetClass="entr" presetSubtype="0" fill="hold" nodeType="clickEffect">
+                                  <p:stCondLst>
+                                    <p:cond delay="0"/>
+                                  </p:stCondLst>
+                                  <p:childTnLst>
+                                    <p:set>
+                                      <p:cBhvr>
+                                        <p:cTn id="100" dur="1" fill="hold">
+                                          <p:stCondLst>
+                                            <p:cond delay="0"/>
+                                          </p:stCondLst>
+                                        </p:cTn>
+                                        <p:tgtEl>
+                                          <p:spTgt spid="92"/>
+                                        </p:tgtEl>
+                                        <p:attrNameLst>
+                                          <p:attrName>style.visibility</p:attrName>
+                                        </p:attrNameLst>
+                                      </p:cBhvr>
+                                      <p:to>
+                                        <p:strVal val="visible"/>
+                                      </p:to>
+                                    </p:set>
+                                  </p:childTnLst>
+                                </p:cTn>
+                              </p:par>
+                              <p:par>
+                                <p:cTn id="101" presetID="1" presetClass="entr" presetSubtype="0" fill="hold" nodeType="withEffect">
+                                  <p:stCondLst>
+                                    <p:cond delay="0"/>
+                                  </p:stCondLst>
+                                  <p:childTnLst>
+                                    <p:set>
+                                      <p:cBhvr>
+                                        <p:cTn id="102" dur="1" fill="hold">
+                                          <p:stCondLst>
+                                            <p:cond delay="0"/>
+                                          </p:stCondLst>
+                                        </p:cTn>
+                                        <p:tgtEl>
+                                          <p:spTgt spid="97"/>
+                                        </p:tgtEl>
+                                        <p:attrNameLst>
+                                          <p:attrName>style.visibility</p:attrName>
+                                        </p:attrNameLst>
+                                      </p:cBhvr>
+                                      <p:to>
+                                        <p:strVal val="visible"/>
+                                      </p:to>
+                                    </p:set>
+                                  </p:childTnLst>
+                                </p:cTn>
+                              </p:par>
+                            </p:childTnLst>
+                          </p:cTn>
+                        </p:par>
+                      </p:childTnLst>
+                    </p:cTn>
+                  </p:par>
+                  <p:par>
+                    <p:cTn id="103" fill="hold">
+                      <p:stCondLst>
+                        <p:cond delay="indefinite"/>
+                      </p:stCondLst>
+                      <p:childTnLst>
+                        <p:par>
+                          <p:cTn id="104" fill="hold">
+                            <p:stCondLst>
+                              <p:cond delay="0"/>
+                            </p:stCondLst>
+                            <p:childTnLst>
+                              <p:par>
+                                <p:cTn id="105" presetID="1" presetClass="entr" presetSubtype="0" fill="hold" nodeType="clickEffect">
+                                  <p:stCondLst>
+                                    <p:cond delay="0"/>
+                                  </p:stCondLst>
+                                  <p:childTnLst>
+                                    <p:set>
+                                      <p:cBhvr>
+                                        <p:cTn id="106" dur="1" fill="hold">
+                                          <p:stCondLst>
+                                            <p:cond delay="0"/>
+                                          </p:stCondLst>
+                                        </p:cTn>
+                                        <p:tgtEl>
+                                          <p:spTgt spid="42"/>
+                                        </p:tgtEl>
+                                        <p:attrNameLst>
+                                          <p:attrName>style.visibility</p:attrName>
+                                        </p:attrNameLst>
+                                      </p:cBhvr>
+                                      <p:to>
+                                        <p:strVal val="visible"/>
+                                      </p:to>
+                                    </p:set>
+                                  </p:childTnLst>
+                                </p:cTn>
+                              </p:par>
+                              <p:par>
+                                <p:cTn id="107" presetID="1" presetClass="entr" presetSubtype="0" fill="hold" grpId="0" nodeType="withEffect">
+                                  <p:stCondLst>
+                                    <p:cond delay="0"/>
+                                  </p:stCondLst>
+                                  <p:childTnLst>
+                                    <p:set>
+                                      <p:cBhvr>
+                                        <p:cTn id="108" dur="1" fill="hold">
+                                          <p:stCondLst>
+                                            <p:cond delay="0"/>
+                                          </p:stCondLst>
+                                        </p:cTn>
+                                        <p:tgtEl>
+                                          <p:spTgt spid="119"/>
+                                        </p:tgtEl>
+                                        <p:attrNameLst>
+                                          <p:attrName>style.visibility</p:attrName>
+                                        </p:attrNameLst>
+                                      </p:cBhvr>
+                                      <p:to>
+                                        <p:strVal val="visible"/>
+                                      </p:to>
+                                    </p:set>
+                                  </p:childTnLst>
+                                </p:cTn>
+                              </p:par>
+                              <p:par>
+                                <p:cTn id="109" presetID="1" presetClass="entr" presetSubtype="0" fill="hold" grpId="0" nodeType="withEffect">
+                                  <p:stCondLst>
+                                    <p:cond delay="0"/>
+                                  </p:stCondLst>
+                                  <p:childTnLst>
+                                    <p:set>
+                                      <p:cBhvr>
+                                        <p:cTn id="110" dur="1" fill="hold">
+                                          <p:stCondLst>
+                                            <p:cond delay="0"/>
+                                          </p:stCondLst>
+                                        </p:cTn>
+                                        <p:tgtEl>
+                                          <p:spTgt spid="41"/>
+                                        </p:tgtEl>
+                                        <p:attrNameLst>
+                                          <p:attrName>style.visibility</p:attrName>
+                                        </p:attrNameLst>
+                                      </p:cBhvr>
+                                      <p:to>
+                                        <p:strVal val="visible"/>
+                                      </p:to>
+                                    </p:set>
+                                  </p:childTnLst>
+                                </p:cTn>
+                              </p:par>
+                            </p:childTnLst>
+                          </p:cTn>
+                        </p:par>
+                      </p:childTnLst>
+                    </p:cTn>
+                  </p:par>
+                  <p:par>
+                    <p:cTn id="111" fill="hold">
+                      <p:stCondLst>
+                        <p:cond delay="indefinite"/>
+                      </p:stCondLst>
+                      <p:childTnLst>
+                        <p:par>
+                          <p:cTn id="112" fill="hold">
+                            <p:stCondLst>
+                              <p:cond delay="0"/>
+                            </p:stCondLst>
+                            <p:childTnLst>
+                              <p:par>
+                                <p:cTn id="113" presetID="1" presetClass="entr" presetSubtype="0" fill="hold" grpId="0" nodeType="clickEffect">
+                                  <p:stCondLst>
+                                    <p:cond delay="0"/>
+                                  </p:stCondLst>
+                                  <p:childTnLst>
+                                    <p:set>
+                                      <p:cBhvr>
+                                        <p:cTn id="114" dur="1" fill="hold">
+                                          <p:stCondLst>
+                                            <p:cond delay="0"/>
+                                          </p:stCondLst>
+                                        </p:cTn>
+                                        <p:tgtEl>
+                                          <p:spTgt spid="45"/>
+                                        </p:tgtEl>
+                                        <p:attrNameLst>
+                                          <p:attrName>style.visibility</p:attrName>
+                                        </p:attrNameLst>
+                                      </p:cBhvr>
+                                      <p:to>
+                                        <p:strVal val="visible"/>
+                                      </p:to>
+                                    </p:set>
+                                  </p:childTnLst>
+                                </p:cTn>
+                              </p:par>
+                            </p:childTnLst>
+                          </p:cTn>
+                        </p:par>
+                      </p:childTnLst>
+                    </p:cTn>
+                  </p:par>
+                  <p:par>
+                    <p:cTn id="115" fill="hold">
+                      <p:stCondLst>
+                        <p:cond delay="indefinite"/>
+                      </p:stCondLst>
+                      <p:childTnLst>
+                        <p:par>
+                          <p:cTn id="116" fill="hold">
+                            <p:stCondLst>
+                              <p:cond delay="0"/>
+                            </p:stCondLst>
+                            <p:childTnLst>
+                              <p:par>
+                                <p:cTn id="117" presetID="1" presetClass="entr" presetSubtype="0" fill="hold" grpId="0" nodeType="clickEffect">
+                                  <p:stCondLst>
+                                    <p:cond delay="0"/>
+                                  </p:stCondLst>
+                                  <p:childTnLst>
+                                    <p:set>
+                                      <p:cBhvr>
+                                        <p:cTn id="118" dur="1" fill="hold">
+                                          <p:stCondLst>
+                                            <p:cond delay="0"/>
+                                          </p:stCondLst>
+                                        </p:cTn>
+                                        <p:tgtEl>
+                                          <p:spTgt spid="58"/>
+                                        </p:tgtEl>
+                                        <p:attrNameLst>
+                                          <p:attrName>style.visibility</p:attrName>
+                                        </p:attrNameLst>
+                                      </p:cBhvr>
+                                      <p:to>
+                                        <p:strVal val="visible"/>
+                                      </p:to>
+                                    </p:set>
+                                  </p:childTnLst>
+                                </p:cTn>
+                              </p:par>
+                              <p:par>
+                                <p:cTn id="119" presetID="1" presetClass="entr" presetSubtype="0" fill="hold" nodeType="withEffect">
+                                  <p:stCondLst>
+                                    <p:cond delay="0"/>
+                                  </p:stCondLst>
+                                  <p:childTnLst>
+                                    <p:set>
+                                      <p:cBhvr>
+                                        <p:cTn id="120" dur="1" fill="hold">
+                                          <p:stCondLst>
+                                            <p:cond delay="0"/>
+                                          </p:stCondLst>
+                                        </p:cTn>
+                                        <p:tgtEl>
+                                          <p:spTgt spid="47"/>
+                                        </p:tgtEl>
+                                        <p:attrNameLst>
+                                          <p:attrName>style.visibility</p:attrName>
+                                        </p:attrNameLst>
+                                      </p:cBhvr>
+                                      <p:to>
+                                        <p:strVal val="visible"/>
+                                      </p:to>
+                                    </p:set>
+                                  </p:childTnLst>
+                                </p:cTn>
+                              </p:par>
+                              <p:par>
+                                <p:cTn id="121" presetID="1" presetClass="entr" presetSubtype="0" fill="hold" grpId="0" nodeType="withEffect">
+                                  <p:stCondLst>
+                                    <p:cond delay="0"/>
+                                  </p:stCondLst>
+                                  <p:childTnLst>
+                                    <p:set>
+                                      <p:cBhvr>
+                                        <p:cTn id="122" dur="1" fill="hold">
+                                          <p:stCondLst>
+                                            <p:cond delay="0"/>
+                                          </p:stCondLst>
+                                        </p:cTn>
+                                        <p:tgtEl>
+                                          <p:spTgt spid="49"/>
+                                        </p:tgtEl>
+                                        <p:attrNameLst>
+                                          <p:attrName>style.visibility</p:attrName>
+                                        </p:attrNameLst>
+                                      </p:cBhvr>
+                                      <p:to>
+                                        <p:strVal val="visible"/>
+                                      </p:to>
+                                    </p:set>
+                                  </p:childTnLst>
+                                </p:cTn>
+                              </p:par>
+                              <p:par>
+                                <p:cTn id="123" presetID="1" presetClass="entr" presetSubtype="0" fill="hold" grpId="0" nodeType="withEffect">
+                                  <p:stCondLst>
+                                    <p:cond delay="0"/>
+                                  </p:stCondLst>
+                                  <p:childTnLst>
+                                    <p:set>
+                                      <p:cBhvr>
+                                        <p:cTn id="124" dur="1" fill="hold">
+                                          <p:stCondLst>
+                                            <p:cond delay="0"/>
+                                          </p:stCondLst>
+                                        </p:cTn>
+                                        <p:tgtEl>
+                                          <p:spTgt spid="64"/>
+                                        </p:tgtEl>
+                                        <p:attrNameLst>
+                                          <p:attrName>style.visibility</p:attrName>
+                                        </p:attrNameLst>
+                                      </p:cBhvr>
+                                      <p:to>
+                                        <p:strVal val="visible"/>
+                                      </p:to>
+                                    </p:set>
+                                  </p:childTnLst>
+                                </p:cTn>
+                              </p:par>
+                              <p:par>
+                                <p:cTn id="125" presetID="1" presetClass="entr" presetSubtype="0" fill="hold" nodeType="withEffect">
+                                  <p:stCondLst>
+                                    <p:cond delay="0"/>
+                                  </p:stCondLst>
+                                  <p:childTnLst>
+                                    <p:set>
+                                      <p:cBhvr>
+                                        <p:cTn id="126" dur="1" fill="hold">
+                                          <p:stCondLst>
+                                            <p:cond delay="0"/>
+                                          </p:stCondLst>
+                                        </p:cTn>
+                                        <p:tgtEl>
+                                          <p:spTgt spid="60"/>
+                                        </p:tgtEl>
+                                        <p:attrNameLst>
+                                          <p:attrName>style.visibility</p:attrName>
+                                        </p:attrNameLst>
+                                      </p:cBhvr>
+                                      <p:to>
+                                        <p:strVal val="visible"/>
+                                      </p:to>
+                                    </p:set>
+                                  </p:childTnLst>
+                                </p:cTn>
+                              </p:par>
+                              <p:par>
+                                <p:cTn id="127" presetID="1" presetClass="entr" presetSubtype="0" fill="hold" grpId="0" nodeType="withEffect">
+                                  <p:stCondLst>
+                                    <p:cond delay="0"/>
+                                  </p:stCondLst>
+                                  <p:childTnLst>
+                                    <p:set>
+                                      <p:cBhvr>
+                                        <p:cTn id="128" dur="1" fill="hold">
+                                          <p:stCondLst>
+                                            <p:cond delay="0"/>
+                                          </p:stCondLst>
+                                        </p:cTn>
+                                        <p:tgtEl>
+                                          <p:spTgt spid="96"/>
+                                        </p:tgtEl>
+                                        <p:attrNameLst>
+                                          <p:attrName>style.visibility</p:attrName>
+                                        </p:attrNameLst>
+                                      </p:cBhvr>
+                                      <p:to>
+                                        <p:strVal val="visible"/>
+                                      </p:to>
+                                    </p:set>
+                                  </p:childTnLst>
+                                </p:cTn>
+                              </p:par>
+                              <p:par>
+                                <p:cTn id="129" presetID="1" presetClass="entr" presetSubtype="0" fill="hold" nodeType="withEffect">
+                                  <p:stCondLst>
+                                    <p:cond delay="0"/>
+                                  </p:stCondLst>
+                                  <p:childTnLst>
+                                    <p:set>
+                                      <p:cBhvr>
+                                        <p:cTn id="130" dur="1" fill="hold">
+                                          <p:stCondLst>
+                                            <p:cond delay="0"/>
+                                          </p:stCondLst>
+                                        </p:cTn>
+                                        <p:tgtEl>
+                                          <p:spTgt spid="95"/>
+                                        </p:tgtEl>
+                                        <p:attrNameLst>
+                                          <p:attrName>style.visibility</p:attrName>
+                                        </p:attrNameLst>
+                                      </p:cBhvr>
+                                      <p:to>
+                                        <p:strVal val="visible"/>
+                                      </p:to>
+                                    </p:set>
+                                  </p:childTnLst>
+                                </p:cTn>
+                              </p:par>
+                              <p:par>
+                                <p:cTn id="131" presetID="1" presetClass="entr" presetSubtype="0" fill="hold" nodeType="withEffect">
+                                  <p:stCondLst>
+                                    <p:cond delay="0"/>
+                                  </p:stCondLst>
+                                  <p:childTnLst>
+                                    <p:set>
+                                      <p:cBhvr>
+                                        <p:cTn id="132" dur="1" fill="hold">
+                                          <p:stCondLst>
+                                            <p:cond delay="0"/>
+                                          </p:stCondLst>
+                                        </p:cTn>
+                                        <p:tgtEl>
+                                          <p:spTgt spid="46"/>
+                                        </p:tgtEl>
+                                        <p:attrNameLst>
+                                          <p:attrName>style.visibility</p:attrName>
+                                        </p:attrNameLst>
+                                      </p:cBhvr>
+                                      <p:to>
+                                        <p:strVal val="visible"/>
+                                      </p:to>
+                                    </p:set>
+                                  </p:childTnLst>
+                                </p:cTn>
+                              </p:par>
+                            </p:childTnLst>
+                          </p:cTn>
+                        </p:par>
+                      </p:childTnLst>
+                    </p:cTn>
+                  </p:par>
+                </p:childTnLst>
+              </p:cTn>
+              <p:prevCondLst>
+                <p:cond evt="onPrev" delay="0">
+                  <p:tgtEl>
+                    <p:sldTgt/>
+                  </p:tgtEl>
+                </p:cond>
+              </p:prevCondLst>
+              <p:nextCondLst>
+                <p:cond evt="onNext" delay="0">
+                  <p:tgtEl>
+                    <p:sldTgt/>
+                  </p:tgtEl>
+                </p:cond>
+              </p:nextCondLst>
+            </p:seq>
+          </p:childTnLst>
+        </p:cTn>
+      </p:par>
+    </p:tnLst>
+    <p:bldLst>
+      <p:bldP spid="7" grpId="0"/>
+      <p:bldP spid="8" grpId="0"/>
+      <p:bldP spid="9" grpId="0"/>
+      <p:bldP spid="13" grpId="0"/>
+      <p:bldP spid="14" grpId="0"/>
+      <p:bldP spid="39" grpId="0"/>
+      <p:bldP spid="41" grpId="0"/>
+      <p:bldP spid="45" grpId="0"/>
+      <p:bldP spid="49" grpId="0"/>
+      <p:bldP spid="58" grpId="0"/>
+      <p:bldP spid="64" grpId="0"/>
+      <p:bldP spid="68" grpId="0" animBg="1"/>
+      <p:bldP spid="76" grpId="0" animBg="1"/>
+      <p:bldP spid="84" grpId="0" animBg="1"/>
+      <p:bldP spid="96" grpId="0" animBg="1"/>
+      <p:bldP spid="82" grpId="0" animBg="1"/>
+      <p:bldP spid="117" grpId="0" animBg="1"/>
+      <p:bldP spid="119" grpId="0" animBg="1"/>
+      <p:bldP spid="121" grpId="0" animBg="1"/>
+      <p:bldP spid="125" grpId="0"/>
+      <p:bldP spid="126" grpId="0"/>
+      <p:bldP spid="55" grpId="0" animBg="1"/>
+      <p:bldP spid="66" grpId="0" animBg="1"/>
+      <p:bldP spid="75" grpId="0"/>
+      <p:bldP spid="77" grpId="0"/>
+      <p:bldP spid="93" grpId="0"/>
+    </p:bldLst>
+  </p:timing>
 </p:sld>
 </file>
 

</xml_diff>